<commit_message>
MAJ présentation du cahier de charges
</commit_message>
<xml_diff>
--- a/ cars-locator/Documents_Presentations/PrésentationDeLApplication.pptx
+++ b/ cars-locator/Documents_Presentations/PrésentationDeLApplication.pptx
@@ -6,8 +6,13 @@
   </p:sldMasterIdLst>
   <p:sldIdLst>
     <p:sldId id="256" r:id="rId2"/>
-    <p:sldId id="257" r:id="rId3"/>
-    <p:sldId id="258" r:id="rId4"/>
+    <p:sldId id="259" r:id="rId3"/>
+    <p:sldId id="260" r:id="rId4"/>
+    <p:sldId id="261" r:id="rId5"/>
+    <p:sldId id="262" r:id="rId6"/>
+    <p:sldId id="263" r:id="rId7"/>
+    <p:sldId id="264" r:id="rId8"/>
+    <p:sldId id="258" r:id="rId9"/>
   </p:sldIdLst>
   <p:sldSz cx="12192000" cy="6858000"/>
   <p:notesSz cx="6858000" cy="9144000"/>
@@ -106,6 +111,11 @@
       </a:defRPr>
     </a:lvl9pPr>
   </p:defaultTextStyle>
+  <p:extLst>
+    <p:ext uri="{EFAFB233-063F-42B5-8137-9DF3F51BA10A}">
+      <p15:sldGuideLst xmlns:p15="http://schemas.microsoft.com/office/powerpoint/2012/main"/>
+    </p:ext>
+  </p:extLst>
 </p:presentation>
 </file>
 
@@ -612,7 +622,7 @@
             <a:fld id="{B61BEF0D-F0BB-DE4B-95CE-6DB70DBA9567}" type="datetimeFigureOut">
               <a:rPr lang="en-US" smtClean="0"/>
               <a:pPr/>
-              <a:t>4/4/2014</a:t>
+              <a:t>5/21/2014</a:t>
             </a:fld>
             <a:endParaRPr lang="en-US" dirty="0"/>
           </a:p>
@@ -910,7 +920,7 @@
             <a:fld id="{B61BEF0D-F0BB-DE4B-95CE-6DB70DBA9567}" type="datetimeFigureOut">
               <a:rPr lang="en-US" smtClean="0"/>
               <a:pPr/>
-              <a:t>4/4/2014</a:t>
+              <a:t>5/21/2014</a:t>
             </a:fld>
             <a:endParaRPr lang="en-US" dirty="0"/>
           </a:p>
@@ -1160,7 +1170,7 @@
             <a:fld id="{B61BEF0D-F0BB-DE4B-95CE-6DB70DBA9567}" type="datetimeFigureOut">
               <a:rPr lang="en-US" smtClean="0"/>
               <a:pPr/>
-              <a:t>4/4/2014</a:t>
+              <a:t>5/21/2014</a:t>
             </a:fld>
             <a:endParaRPr lang="en-US" dirty="0"/>
           </a:p>
@@ -1702,7 +1712,7 @@
             <a:fld id="{B61BEF0D-F0BB-DE4B-95CE-6DB70DBA9567}" type="datetimeFigureOut">
               <a:rPr lang="en-US" smtClean="0"/>
               <a:pPr/>
-              <a:t>4/4/2014</a:t>
+              <a:t>5/21/2014</a:t>
             </a:fld>
             <a:endParaRPr lang="en-US" dirty="0"/>
           </a:p>
@@ -1952,7 +1962,7 @@
             <a:fld id="{B61BEF0D-F0BB-DE4B-95CE-6DB70DBA9567}" type="datetimeFigureOut">
               <a:rPr lang="en-US" smtClean="0"/>
               <a:pPr/>
-              <a:t>4/4/2014</a:t>
+              <a:t>5/21/2014</a:t>
             </a:fld>
             <a:endParaRPr lang="en-US" dirty="0"/>
           </a:p>
@@ -2486,7 +2496,7 @@
             <a:fld id="{B61BEF0D-F0BB-DE4B-95CE-6DB70DBA9567}" type="datetimeFigureOut">
               <a:rPr lang="en-US" smtClean="0"/>
               <a:pPr/>
-              <a:t>4/4/2014</a:t>
+              <a:t>5/21/2014</a:t>
             </a:fld>
             <a:endParaRPr lang="en-US" dirty="0"/>
           </a:p>
@@ -2785,7 +2795,7 @@
             <a:fld id="{B61BEF0D-F0BB-DE4B-95CE-6DB70DBA9567}" type="datetimeFigureOut">
               <a:rPr lang="en-US" smtClean="0"/>
               <a:pPr/>
-              <a:t>4/4/2014</a:t>
+              <a:t>5/21/2014</a:t>
             </a:fld>
             <a:endParaRPr lang="en-US" dirty="0"/>
           </a:p>
@@ -2961,7 +2971,7 @@
             <a:fld id="{B61BEF0D-F0BB-DE4B-95CE-6DB70DBA9567}" type="datetimeFigureOut">
               <a:rPr lang="en-US" smtClean="0"/>
               <a:pPr/>
-              <a:t>4/4/2014</a:t>
+              <a:t>5/21/2014</a:t>
             </a:fld>
             <a:endParaRPr lang="en-US" dirty="0"/>
           </a:p>
@@ -3143,7 +3153,7 @@
             <a:fld id="{B61BEF0D-F0BB-DE4B-95CE-6DB70DBA9567}" type="datetimeFigureOut">
               <a:rPr lang="en-US" smtClean="0"/>
               <a:pPr/>
-              <a:t>4/4/2014</a:t>
+              <a:t>5/21/2014</a:t>
             </a:fld>
             <a:endParaRPr lang="en-US" dirty="0"/>
           </a:p>
@@ -3315,7 +3325,7 @@
             <a:fld id="{B61BEF0D-F0BB-DE4B-95CE-6DB70DBA9567}" type="datetimeFigureOut">
               <a:rPr lang="en-US" smtClean="0"/>
               <a:pPr/>
-              <a:t>4/4/2014</a:t>
+              <a:t>5/21/2014</a:t>
             </a:fld>
             <a:endParaRPr lang="en-US" dirty="0"/>
           </a:p>
@@ -3568,7 +3578,7 @@
             <a:fld id="{B61BEF0D-F0BB-DE4B-95CE-6DB70DBA9567}" type="datetimeFigureOut">
               <a:rPr lang="en-US" smtClean="0"/>
               <a:pPr/>
-              <a:t>4/4/2014</a:t>
+              <a:t>5/21/2014</a:t>
             </a:fld>
             <a:endParaRPr lang="en-US" dirty="0"/>
           </a:p>
@@ -3867,7 +3877,7 @@
             <a:fld id="{B61BEF0D-F0BB-DE4B-95CE-6DB70DBA9567}" type="datetimeFigureOut">
               <a:rPr lang="en-US" smtClean="0"/>
               <a:pPr/>
-              <a:t>4/4/2014</a:t>
+              <a:t>5/21/2014</a:t>
             </a:fld>
             <a:endParaRPr lang="en-US" dirty="0"/>
           </a:p>
@@ -4311,7 +4321,7 @@
             <a:fld id="{B61BEF0D-F0BB-DE4B-95CE-6DB70DBA9567}" type="datetimeFigureOut">
               <a:rPr lang="en-US" smtClean="0"/>
               <a:pPr/>
-              <a:t>4/4/2014</a:t>
+              <a:t>5/21/2014</a:t>
             </a:fld>
             <a:endParaRPr lang="en-US" dirty="0"/>
           </a:p>
@@ -4431,7 +4441,7 @@
             <a:fld id="{B61BEF0D-F0BB-DE4B-95CE-6DB70DBA9567}" type="datetimeFigureOut">
               <a:rPr lang="en-US" smtClean="0"/>
               <a:pPr/>
-              <a:t>4/4/2014</a:t>
+              <a:t>5/21/2014</a:t>
             </a:fld>
             <a:endParaRPr lang="en-US" dirty="0"/>
           </a:p>
@@ -4528,7 +4538,7 @@
             <a:fld id="{B61BEF0D-F0BB-DE4B-95CE-6DB70DBA9567}" type="datetimeFigureOut">
               <a:rPr lang="en-US" smtClean="0"/>
               <a:pPr/>
-              <a:t>4/4/2014</a:t>
+              <a:t>5/21/2014</a:t>
             </a:fld>
             <a:endParaRPr lang="en-US" dirty="0"/>
           </a:p>
@@ -4813,7 +4823,7 @@
             <a:fld id="{B61BEF0D-F0BB-DE4B-95CE-6DB70DBA9567}" type="datetimeFigureOut">
               <a:rPr lang="en-US" smtClean="0"/>
               <a:pPr/>
-              <a:t>4/4/2014</a:t>
+              <a:t>5/21/2014</a:t>
             </a:fld>
             <a:endParaRPr lang="en-US" dirty="0"/>
           </a:p>
@@ -5106,7 +5116,7 @@
             <a:fld id="{B61BEF0D-F0BB-DE4B-95CE-6DB70DBA9567}" type="datetimeFigureOut">
               <a:rPr lang="en-US" smtClean="0"/>
               <a:pPr/>
-              <a:t>4/4/2014</a:t>
+              <a:t>5/21/2014</a:t>
             </a:fld>
             <a:endParaRPr lang="en-US" dirty="0"/>
           </a:p>
@@ -5638,7 +5648,7 @@
             <a:fld id="{B61BEF0D-F0BB-DE4B-95CE-6DB70DBA9567}" type="datetimeFigureOut">
               <a:rPr lang="en-US" smtClean="0"/>
               <a:pPr/>
-              <a:t>4/4/2014</a:t>
+              <a:t>5/21/2014</a:t>
             </a:fld>
             <a:endParaRPr lang="en-US" dirty="0"/>
           </a:p>
@@ -6365,130 +6375,74 @@
           <a:chExt cx="0" cy="0"/>
         </a:xfrm>
       </p:grpSpPr>
-      <p:pic>
-        <p:nvPicPr>
-          <p:cNvPr id="8" name="Picture 7"/>
-          <p:cNvPicPr>
-            <a:picLocks noChangeAspect="1"/>
-          </p:cNvPicPr>
-          <p:nvPr/>
-        </p:nvPicPr>
-        <p:blipFill>
-          <a:blip r:embed="rId2">
-            <a:extLst>
-              <a:ext uri="{28A0092B-C50C-407E-A947-70E740481C1C}">
-                <a14:useLocalDpi xmlns:a14="http://schemas.microsoft.com/office/drawing/2010/main" val="0"/>
-              </a:ext>
-            </a:extLst>
-          </a:blip>
-          <a:stretch>
-            <a:fillRect/>
-          </a:stretch>
-        </p:blipFill>
-        <p:spPr>
-          <a:xfrm>
-            <a:off x="1805486" y="1113144"/>
-            <a:ext cx="8964874" cy="4482437"/>
-          </a:xfrm>
-          <a:prstGeom prst="rect">
-            <a:avLst/>
-          </a:prstGeom>
-        </p:spPr>
-      </p:pic>
-      <p:pic>
-        <p:nvPicPr>
-          <p:cNvPr id="9" name="Picture 8"/>
-          <p:cNvPicPr>
-            <a:picLocks noChangeAspect="1"/>
-          </p:cNvPicPr>
-          <p:nvPr/>
-        </p:nvPicPr>
-        <p:blipFill>
-          <a:blip r:embed="rId3">
-            <a:extLst>
-              <a:ext uri="{28A0092B-C50C-407E-A947-70E740481C1C}">
-                <a14:useLocalDpi xmlns:a14="http://schemas.microsoft.com/office/drawing/2010/main" val="0"/>
-              </a:ext>
-            </a:extLst>
-          </a:blip>
-          <a:stretch>
-            <a:fillRect/>
-          </a:stretch>
-        </p:blipFill>
-        <p:spPr>
-          <a:xfrm rot="20092029">
-            <a:off x="1677398" y="738469"/>
-            <a:ext cx="3448079" cy="2128907"/>
-          </a:xfrm>
-          <a:prstGeom prst="rect">
-            <a:avLst/>
-          </a:prstGeom>
-        </p:spPr>
-      </p:pic>
-      <p:pic>
-        <p:nvPicPr>
-          <p:cNvPr id="10" name="Picture 9"/>
-          <p:cNvPicPr>
-            <a:picLocks noChangeAspect="1"/>
-          </p:cNvPicPr>
-          <p:nvPr/>
-        </p:nvPicPr>
-        <p:blipFill>
-          <a:blip r:embed="rId4">
-            <a:extLst>
-              <a:ext uri="{28A0092B-C50C-407E-A947-70E740481C1C}">
-                <a14:useLocalDpi xmlns:a14="http://schemas.microsoft.com/office/drawing/2010/main" val="0"/>
-              </a:ext>
-            </a:extLst>
-          </a:blip>
-          <a:stretch>
-            <a:fillRect/>
-          </a:stretch>
-        </p:blipFill>
-        <p:spPr>
-          <a:xfrm rot="1254761">
-            <a:off x="6878473" y="1252906"/>
-            <a:ext cx="3421743" cy="2412900"/>
-          </a:xfrm>
-          <a:prstGeom prst="rect">
-            <a:avLst/>
-          </a:prstGeom>
-        </p:spPr>
-      </p:pic>
-      <p:pic>
-        <p:nvPicPr>
-          <p:cNvPr id="11" name="Picture 10"/>
-          <p:cNvPicPr>
-            <a:picLocks noChangeAspect="1"/>
-          </p:cNvPicPr>
-          <p:nvPr/>
-        </p:nvPicPr>
-        <p:blipFill>
-          <a:blip r:embed="rId5">
-            <a:extLst>
-              <a:ext uri="{28A0092B-C50C-407E-A947-70E740481C1C}">
-                <a14:useLocalDpi xmlns:a14="http://schemas.microsoft.com/office/drawing/2010/main" val="0"/>
-              </a:ext>
-            </a:extLst>
-          </a:blip>
-          <a:stretch>
-            <a:fillRect/>
-          </a:stretch>
-        </p:blipFill>
-        <p:spPr>
-          <a:xfrm rot="20901364">
-            <a:off x="3461450" y="4698801"/>
-            <a:ext cx="3905795" cy="1352739"/>
-          </a:xfrm>
-          <a:prstGeom prst="rect">
-            <a:avLst/>
-          </a:prstGeom>
-        </p:spPr>
-      </p:pic>
+      <p:sp>
+        <p:nvSpPr>
+          <p:cNvPr id="2" name="Title 1"/>
+          <p:cNvSpPr>
+            <a:spLocks noGrp="1"/>
+          </p:cNvSpPr>
+          <p:nvPr>
+            <p:ph type="title"/>
+          </p:nvPr>
+        </p:nvSpPr>
+        <p:spPr/>
+        <p:txBody>
+          <a:bodyPr>
+            <a:normAutofit/>
+          </a:bodyPr>
+          <a:lstStyle/>
+          <a:p>
+            <a:r>
+              <a:rPr lang="fr-FR" sz="4800" b="1" dirty="0" smtClean="0">
+                <a:solidFill>
+                  <a:schemeClr val="accent5">
+                    <a:lumMod val="50000"/>
+                  </a:schemeClr>
+                </a:solidFill>
+                <a:latin typeface="Calibri" panose="020F0502020204030204" pitchFamily="34" charset="0"/>
+              </a:rPr>
+              <a:t>Introduction</a:t>
+            </a:r>
+            <a:endParaRPr lang="fr-FR" sz="4800" b="1" dirty="0">
+              <a:solidFill>
+                <a:schemeClr val="accent5">
+                  <a:lumMod val="50000"/>
+                </a:schemeClr>
+              </a:solidFill>
+              <a:latin typeface="Calibri" panose="020F0502020204030204" pitchFamily="34" charset="0"/>
+            </a:endParaRPr>
+          </a:p>
+        </p:txBody>
+      </p:sp>
+      <p:sp>
+        <p:nvSpPr>
+          <p:cNvPr id="3" name="Content Placeholder 2"/>
+          <p:cNvSpPr>
+            <a:spLocks noGrp="1"/>
+          </p:cNvSpPr>
+          <p:nvPr>
+            <p:ph idx="1"/>
+          </p:nvPr>
+        </p:nvSpPr>
+        <p:spPr/>
+        <p:txBody>
+          <a:bodyPr/>
+          <a:lstStyle/>
+          <a:p>
+            <a:r>
+              <a:rPr lang="fr-FR" dirty="0"/>
+              <a:t>Les sociétés devant gérer un grand nombre de véhicules (ambulances, transport de marchandise, transport de personnel….) font toujours face au problème des retards et du non-respect des itinéraires, afin de résoudre cette problématique, nous proposons l’application «CarsLocator» qui se chargera de garder un œil et superviser l’ensemble des unités en mouvement.</a:t>
+            </a:r>
+          </a:p>
+          <a:p>
+            <a:endParaRPr lang="fr-FR" dirty="0"/>
+          </a:p>
+        </p:txBody>
+      </p:sp>
     </p:spTree>
     <p:extLst>
       <p:ext uri="{BB962C8B-B14F-4D97-AF65-F5344CB8AC3E}">
-        <p14:creationId xmlns:p14="http://schemas.microsoft.com/office/powerpoint/2010/main" val="836383209"/>
+        <p14:creationId xmlns:p14="http://schemas.microsoft.com/office/powerpoint/2010/main" val="348123178"/>
       </p:ext>
     </p:extLst>
   </p:cSld>
@@ -6516,522 +6470,27 @@
                             </p:stCondLst>
                             <p:childTnLst>
                               <p:par>
-                                <p:cTn id="5" presetID="26" presetClass="exit" presetSubtype="0" fill="hold" nodeType="clickEffect">
+                                <p:cTn id="5" presetID="1" presetClass="entr" presetSubtype="0" fill="hold" grpId="0" nodeType="clickEffect">
                                   <p:stCondLst>
                                     <p:cond delay="0"/>
                                   </p:stCondLst>
                                   <p:childTnLst>
-                                    <p:animEffect transition="out" filter="wipe(down)">
+                                    <p:set>
                                       <p:cBhvr>
-                                        <p:cTn id="6" dur="180" accel="50000">
-                                          <p:stCondLst>
-                                            <p:cond delay="1820"/>
-                                          </p:stCondLst>
-                                        </p:cTn>
-                                        <p:tgtEl>
-                                          <p:spTgt spid="8"/>
-                                        </p:tgtEl>
-                                      </p:cBhvr>
-                                    </p:animEffect>
-                                    <p:anim calcmode="lin" valueType="num">
-                                      <p:cBhvr>
-                                        <p:cTn id="7" dur="1822" tmFilter="0,0; 0.14,0.31; 0.43,0.73; 0.71,0.91; 1.0,1.0">
+                                        <p:cTn id="6" dur="1" fill="hold">
                                           <p:stCondLst>
                                             <p:cond delay="0"/>
                                           </p:stCondLst>
                                         </p:cTn>
                                         <p:tgtEl>
-                                          <p:spTgt spid="8"/>
-                                        </p:tgtEl>
-                                        <p:attrNameLst>
-                                          <p:attrName>ppt_x</p:attrName>
-                                        </p:attrNameLst>
-                                      </p:cBhvr>
-                                      <p:tavLst>
-                                        <p:tav tm="0">
-                                          <p:val>
-                                            <p:strVal val="ppt_x"/>
-                                          </p:val>
-                                        </p:tav>
-                                        <p:tav tm="100000">
-                                          <p:val>
-                                            <p:strVal val="#ppt_x+0.25"/>
-                                          </p:val>
-                                        </p:tav>
-                                      </p:tavLst>
-                                    </p:anim>
-                                    <p:anim calcmode="lin" valueType="num">
-                                      <p:cBhvr>
-                                        <p:cTn id="8" dur="178">
-                                          <p:stCondLst>
-                                            <p:cond delay="1822"/>
-                                          </p:stCondLst>
-                                        </p:cTn>
-                                        <p:tgtEl>
-                                          <p:spTgt spid="8"/>
-                                        </p:tgtEl>
-                                        <p:attrNameLst>
-                                          <p:attrName>ppt_x</p:attrName>
-                                        </p:attrNameLst>
-                                      </p:cBhvr>
-                                      <p:tavLst>
-                                        <p:tav tm="0">
-                                          <p:val>
-                                            <p:strVal val="ppt_x"/>
-                                          </p:val>
-                                        </p:tav>
-                                        <p:tav tm="100000">
-                                          <p:val>
-                                            <p:strVal val="ppt_x"/>
-                                          </p:val>
-                                        </p:tav>
-                                      </p:tavLst>
-                                    </p:anim>
-                                    <p:anim calcmode="lin" valueType="num">
-                                      <p:cBhvr>
-                                        <p:cTn id="9" dur="664" tmFilter="0.0,0.0;0.25,0.07;0.50,0.2;0.75,0.467;1.0,1.0">
-                                          <p:stCondLst>
-                                            <p:cond delay="0"/>
-                                          </p:stCondLst>
-                                        </p:cTn>
-                                        <p:tgtEl>
-                                          <p:spTgt spid="8"/>
-                                        </p:tgtEl>
-                                        <p:attrNameLst>
-                                          <p:attrName>ppt_y</p:attrName>
-                                        </p:attrNameLst>
-                                      </p:cBhvr>
-                                      <p:tavLst>
-                                        <p:tav tm="0">
-                                          <p:val>
-                                            <p:strVal val="ppt_y"/>
-                                          </p:val>
-                                        </p:tav>
-                                        <p:tav tm="5000">
-                                          <p:val>
-                                            <p:strVal val="ppt_y+0.026"/>
-                                          </p:val>
-                                        </p:tav>
-                                        <p:tav tm="10000">
-                                          <p:val>
-                                            <p:strVal val="ppt_y+0.052"/>
-                                          </p:val>
-                                        </p:tav>
-                                        <p:tav tm="15000">
-                                          <p:val>
-                                            <p:strVal val="ppt_y+0.078"/>
-                                          </p:val>
-                                        </p:tav>
-                                        <p:tav tm="20000">
-                                          <p:val>
-                                            <p:strVal val="ppt_y+0.103"/>
-                                          </p:val>
-                                        </p:tav>
-                                        <p:tav tm="30000">
-                                          <p:val>
-                                            <p:strVal val="ppt_y+0.151"/>
-                                          </p:val>
-                                        </p:tav>
-                                        <p:tav tm="40000">
-                                          <p:val>
-                                            <p:strVal val="ppt_y+0.196"/>
-                                          </p:val>
-                                        </p:tav>
-                                        <p:tav tm="50000">
-                                          <p:val>
-                                            <p:strVal val="ppt_y+0.236"/>
-                                          </p:val>
-                                        </p:tav>
-                                        <p:tav tm="60000">
-                                          <p:val>
-                                            <p:strVal val="ppt_y+0.270"/>
-                                          </p:val>
-                                        </p:tav>
-                                        <p:tav tm="70000">
-                                          <p:val>
-                                            <p:strVal val="ppt_y+0.297"/>
-                                          </p:val>
-                                        </p:tav>
-                                        <p:tav tm="80000">
-                                          <p:val>
-                                            <p:strVal val="ppt_y+0.317"/>
-                                          </p:val>
-                                        </p:tav>
-                                        <p:tav tm="90000">
-                                          <p:val>
-                                            <p:strVal val="ppt_y+0.329"/>
-                                          </p:val>
-                                        </p:tav>
-                                        <p:tav tm="100000">
-                                          <p:val>
-                                            <p:strVal val="ppt_y+0.333"/>
-                                          </p:val>
-                                        </p:tav>
-                                      </p:tavLst>
-                                    </p:anim>
-                                    <p:anim calcmode="lin" valueType="num">
-                                      <p:cBhvr>
-                                        <p:cTn id="10" dur="664" tmFilter="0, 0; 0.125,0.2665; 0.25,0.4; 0.375,0.465; 0.5,0.5;  0.625,0.535; 0.75,0.6; 0.875,0.7335; 1,1">
-                                          <p:stCondLst>
-                                            <p:cond delay="664"/>
-                                          </p:stCondLst>
-                                        </p:cTn>
-                                        <p:tgtEl>
-                                          <p:spTgt spid="8"/>
-                                        </p:tgtEl>
-                                        <p:attrNameLst>
-                                          <p:attrName>ppt_y</p:attrName>
-                                        </p:attrNameLst>
-                                      </p:cBhvr>
-                                      <p:tavLst>
-                                        <p:tav tm="0">
-                                          <p:val>
-                                            <p:strVal val="ppt_y"/>
-                                          </p:val>
-                                        </p:tav>
-                                        <p:tav tm="10000">
-                                          <p:val>
-                                            <p:strVal val="ppt_y-0.034"/>
-                                          </p:val>
-                                        </p:tav>
-                                        <p:tav tm="20000">
-                                          <p:val>
-                                            <p:strVal val="ppt_y-0.065"/>
-                                          </p:val>
-                                        </p:tav>
-                                        <p:tav tm="30000">
-                                          <p:val>
-                                            <p:strVal val="ppt_y-0.090"/>
-                                          </p:val>
-                                        </p:tav>
-                                        <p:tav tm="40000">
-                                          <p:val>
-                                            <p:strVal val="ppt_y-0.106"/>
-                                          </p:val>
-                                        </p:tav>
-                                        <p:tav tm="50000">
-                                          <p:val>
-                                            <p:strVal val="ppt_y-0.111"/>
-                                          </p:val>
-                                        </p:tav>
-                                        <p:tav tm="60000">
-                                          <p:val>
-                                            <p:strVal val="ppt_y-0.106"/>
-                                          </p:val>
-                                        </p:tav>
-                                        <p:tav tm="70000">
-                                          <p:val>
-                                            <p:strVal val="ppt_y-0.090"/>
-                                          </p:val>
-                                        </p:tav>
-                                        <p:tav tm="80000">
-                                          <p:val>
-                                            <p:strVal val="ppt_y-0.065"/>
-                                          </p:val>
-                                        </p:tav>
-                                        <p:tav tm="90000">
-                                          <p:val>
-                                            <p:strVal val="ppt_y-0.034"/>
-                                          </p:val>
-                                        </p:tav>
-                                        <p:tav tm="100000">
-                                          <p:val>
-                                            <p:strVal val="ppt_y"/>
-                                          </p:val>
-                                        </p:tav>
-                                      </p:tavLst>
-                                    </p:anim>
-                                    <p:anim calcmode="lin" valueType="num">
-                                      <p:cBhvr>
-                                        <p:cTn id="11" dur="332" tmFilter="0, 0; 0.125,0.2665; 0.25,0.4; 0.375,0.465; 0.5,0.5;  0.625,0.535; 0.75,0.6; 0.875,0.7335; 1,1">
-                                          <p:stCondLst>
-                                            <p:cond delay="1324"/>
-                                          </p:stCondLst>
-                                        </p:cTn>
-                                        <p:tgtEl>
-                                          <p:spTgt spid="8"/>
-                                        </p:tgtEl>
-                                        <p:attrNameLst>
-                                          <p:attrName>ppt_y</p:attrName>
-                                        </p:attrNameLst>
-                                      </p:cBhvr>
-                                      <p:tavLst>
-                                        <p:tav tm="0">
-                                          <p:val>
-                                            <p:strVal val="ppt_y"/>
-                                          </p:val>
-                                        </p:tav>
-                                        <p:tav tm="10000">
-                                          <p:val>
-                                            <p:strVal val="ppt_y-0.011"/>
-                                          </p:val>
-                                        </p:tav>
-                                        <p:tav tm="20000">
-                                          <p:val>
-                                            <p:strVal val="ppt_y-0.022"/>
-                                          </p:val>
-                                        </p:tav>
-                                        <p:tav tm="30000">
-                                          <p:val>
-                                            <p:strVal val="ppt_y-0.030"/>
-                                          </p:val>
-                                        </p:tav>
-                                        <p:tav tm="40000">
-                                          <p:val>
-                                            <p:strVal val="ppt_y-0.035"/>
-                                          </p:val>
-                                        </p:tav>
-                                        <p:tav tm="50000">
-                                          <p:val>
-                                            <p:strVal val="ppt_y-0.037"/>
-                                          </p:val>
-                                        </p:tav>
-                                        <p:tav tm="60000">
-                                          <p:val>
-                                            <p:strVal val="ppt_y-0.035"/>
-                                          </p:val>
-                                        </p:tav>
-                                        <p:tav tm="70000">
-                                          <p:val>
-                                            <p:strVal val="ppt_y-0.030"/>
-                                          </p:val>
-                                        </p:tav>
-                                        <p:tav tm="80000">
-                                          <p:val>
-                                            <p:strVal val="ppt_y-0.022"/>
-                                          </p:val>
-                                        </p:tav>
-                                        <p:tav tm="90000">
-                                          <p:val>
-                                            <p:strVal val="ppt_y-0.011"/>
-                                          </p:val>
-                                        </p:tav>
-                                        <p:tav tm="100000">
-                                          <p:val>
-                                            <p:strVal val="ppt_y"/>
-                                          </p:val>
-                                        </p:tav>
-                                      </p:tavLst>
-                                    </p:anim>
-                                    <p:anim calcmode="lin" valueType="num">
-                                      <p:cBhvr>
-                                        <p:cTn id="12" dur="164" tmFilter="0, 0; 0.125,0.2665; 0.25,0.4; 0.375,0.465; 0.5,0.5;  0.625,0.535; 0.75,0.6; 0.875,0.7335; 1,1">
-                                          <p:stCondLst>
-                                            <p:cond delay="1656"/>
-                                          </p:stCondLst>
-                                        </p:cTn>
-                                        <p:tgtEl>
-                                          <p:spTgt spid="8"/>
-                                        </p:tgtEl>
-                                        <p:attrNameLst>
-                                          <p:attrName>ppt_y</p:attrName>
-                                        </p:attrNameLst>
-                                      </p:cBhvr>
-                                      <p:tavLst>
-                                        <p:tav tm="0">
-                                          <p:val>
-                                            <p:strVal val="ppt_y"/>
-                                          </p:val>
-                                        </p:tav>
-                                        <p:tav tm="10000">
-                                          <p:val>
-                                            <p:strVal val="ppt_y-0.004"/>
-                                          </p:val>
-                                        </p:tav>
-                                        <p:tav tm="20000">
-                                          <p:val>
-                                            <p:strVal val="ppt_y-0.007"/>
-                                          </p:val>
-                                        </p:tav>
-                                        <p:tav tm="30000">
-                                          <p:val>
-                                            <p:strVal val="ppt_y-0.010"/>
-                                          </p:val>
-                                        </p:tav>
-                                        <p:tav tm="40000">
-                                          <p:val>
-                                            <p:strVal val="ppt_y-0.012"/>
-                                          </p:val>
-                                        </p:tav>
-                                        <p:tav tm="50000">
-                                          <p:val>
-                                            <p:strVal val="ppt_y-0.0123"/>
-                                          </p:val>
-                                        </p:tav>
-                                        <p:tav tm="60000">
-                                          <p:val>
-                                            <p:strVal val="ppt_y-0.012"/>
-                                          </p:val>
-                                        </p:tav>
-                                        <p:tav tm="70000">
-                                          <p:val>
-                                            <p:strVal val="ppt_y-0.010"/>
-                                          </p:val>
-                                        </p:tav>
-                                        <p:tav tm="80000">
-                                          <p:val>
-                                            <p:strVal val="ppt_y-0.007"/>
-                                          </p:val>
-                                        </p:tav>
-                                        <p:tav tm="90000">
-                                          <p:val>
-                                            <p:strVal val="ppt_y-0.004"/>
-                                          </p:val>
-                                        </p:tav>
-                                        <p:tav tm="100000">
-                                          <p:val>
-                                            <p:strVal val="ppt_y"/>
-                                          </p:val>
-                                        </p:tav>
-                                      </p:tavLst>
-                                    </p:anim>
-                                    <p:anim calcmode="lin" valueType="num">
-                                      <p:cBhvr>
-                                        <p:cTn id="13" dur="180" accel="50000">
-                                          <p:stCondLst>
-                                            <p:cond delay="1820"/>
-                                          </p:stCondLst>
-                                        </p:cTn>
-                                        <p:tgtEl>
-                                          <p:spTgt spid="8"/>
-                                        </p:tgtEl>
-                                        <p:attrNameLst>
-                                          <p:attrName>ppt_y</p:attrName>
-                                        </p:attrNameLst>
-                                      </p:cBhvr>
-                                      <p:tavLst>
-                                        <p:tav tm="0">
-                                          <p:val>
-                                            <p:strVal val="ppt_y"/>
-                                          </p:val>
-                                        </p:tav>
-                                        <p:tav tm="100000">
-                                          <p:val>
-                                            <p:strVal val="ppt_y+ppt_h"/>
-                                          </p:val>
-                                        </p:tav>
-                                      </p:tavLst>
-                                    </p:anim>
-                                    <p:animScale>
-                                      <p:cBhvr>
-                                        <p:cTn id="14" dur="26">
-                                          <p:stCondLst>
-                                            <p:cond delay="620"/>
-                                          </p:stCondLst>
-                                        </p:cTn>
-                                        <p:tgtEl>
-                                          <p:spTgt spid="8"/>
-                                        </p:tgtEl>
-                                      </p:cBhvr>
-                                      <p:to x="100000" y="60000"/>
-                                    </p:animScale>
-                                    <p:animScale>
-                                      <p:cBhvr>
-                                        <p:cTn id="15" dur="166" decel="50000">
-                                          <p:stCondLst>
-                                            <p:cond delay="646"/>
-                                          </p:stCondLst>
-                                        </p:cTn>
-                                        <p:tgtEl>
-                                          <p:spTgt spid="8"/>
-                                        </p:tgtEl>
-                                      </p:cBhvr>
-                                      <p:to x="100000" y="100000"/>
-                                    </p:animScale>
-                                    <p:animScale>
-                                      <p:cBhvr>
-                                        <p:cTn id="16" dur="26">
-                                          <p:stCondLst>
-                                            <p:cond delay="1312"/>
-                                          </p:stCondLst>
-                                        </p:cTn>
-                                        <p:tgtEl>
-                                          <p:spTgt spid="8"/>
-                                        </p:tgtEl>
-                                      </p:cBhvr>
-                                      <p:to x="100000" y="80000"/>
-                                    </p:animScale>
-                                    <p:animScale>
-                                      <p:cBhvr>
-                                        <p:cTn id="17" dur="166" decel="50000">
-                                          <p:stCondLst>
-                                            <p:cond delay="1338"/>
-                                          </p:stCondLst>
-                                        </p:cTn>
-                                        <p:tgtEl>
-                                          <p:spTgt spid="8"/>
-                                        </p:tgtEl>
-                                      </p:cBhvr>
-                                      <p:to x="100000" y="100000"/>
-                                    </p:animScale>
-                                    <p:animScale>
-                                      <p:cBhvr>
-                                        <p:cTn id="18" dur="26">
-                                          <p:stCondLst>
-                                            <p:cond delay="1642"/>
-                                          </p:stCondLst>
-                                        </p:cTn>
-                                        <p:tgtEl>
-                                          <p:spTgt spid="8"/>
-                                        </p:tgtEl>
-                                      </p:cBhvr>
-                                      <p:to x="100000" y="90000"/>
-                                    </p:animScale>
-                                    <p:animScale>
-                                      <p:cBhvr>
-                                        <p:cTn id="19" dur="166" decel="50000">
-                                          <p:stCondLst>
-                                            <p:cond delay="1668"/>
-                                          </p:stCondLst>
-                                        </p:cTn>
-                                        <p:tgtEl>
-                                          <p:spTgt spid="8"/>
-                                        </p:tgtEl>
-                                      </p:cBhvr>
-                                      <p:to x="100000" y="100000"/>
-                                    </p:animScale>
-                                    <p:animScale>
-                                      <p:cBhvr>
-                                        <p:cTn id="20" dur="26">
-                                          <p:stCondLst>
-                                            <p:cond delay="1808"/>
-                                          </p:stCondLst>
-                                        </p:cTn>
-                                        <p:tgtEl>
-                                          <p:spTgt spid="8"/>
-                                        </p:tgtEl>
-                                      </p:cBhvr>
-                                      <p:to x="100000" y="95000"/>
-                                    </p:animScale>
-                                    <p:animScale>
-                                      <p:cBhvr>
-                                        <p:cTn id="21" dur="166" decel="50000">
-                                          <p:stCondLst>
-                                            <p:cond delay="1834"/>
-                                          </p:stCondLst>
-                                        </p:cTn>
-                                        <p:tgtEl>
-                                          <p:spTgt spid="8"/>
-                                        </p:tgtEl>
-                                      </p:cBhvr>
-                                      <p:to x="100000" y="100000"/>
-                                    </p:animScale>
-                                    <p:set>
-                                      <p:cBhvr>
-                                        <p:cTn id="22" dur="1" fill="hold">
-                                          <p:stCondLst>
-                                            <p:cond delay="1999"/>
-                                          </p:stCondLst>
-                                        </p:cTn>
-                                        <p:tgtEl>
-                                          <p:spTgt spid="8"/>
+                                          <p:spTgt spid="2"/>
                                         </p:tgtEl>
                                         <p:attrNameLst>
                                           <p:attrName>style.visibility</p:attrName>
                                         </p:attrNameLst>
                                       </p:cBhvr>
                                       <p:to>
-                                        <p:strVal val="hidden"/>
+                                        <p:strVal val="visible"/>
                                       </p:to>
                                     </p:set>
                                   </p:childTnLst>
@@ -7044,32 +6503,292 @@
                     </p:cTn>
                   </p:par>
                   <p:par>
-                    <p:cTn id="23" fill="hold">
+                    <p:cTn id="7" fill="hold">
                       <p:stCondLst>
                         <p:cond delay="indefinite"/>
                       </p:stCondLst>
                       <p:childTnLst>
                         <p:par>
-                          <p:cTn id="24" fill="hold">
+                          <p:cTn id="8" fill="hold">
                             <p:stCondLst>
                               <p:cond delay="0"/>
                             </p:stCondLst>
                             <p:childTnLst>
                               <p:par>
-                                <p:cTn id="25" presetID="6" presetClass="entr" presetSubtype="16" fill="hold" nodeType="clickEffect">
+                                <p:cTn id="9" presetID="42" presetClass="entr" presetSubtype="0" fill="hold" grpId="0" nodeType="clickEffect">
                                   <p:stCondLst>
                                     <p:cond delay="0"/>
                                   </p:stCondLst>
                                   <p:childTnLst>
                                     <p:set>
                                       <p:cBhvr>
-                                        <p:cTn id="26" dur="1" fill="hold">
+                                        <p:cTn id="10" dur="1" fill="hold">
                                           <p:stCondLst>
                                             <p:cond delay="0"/>
                                           </p:stCondLst>
                                         </p:cTn>
                                         <p:tgtEl>
-                                          <p:spTgt spid="9"/>
+                                          <p:spTgt spid="3">
+                                            <p:txEl>
+                                              <p:pRg st="0" end="0"/>
+                                            </p:txEl>
+                                          </p:spTgt>
+                                        </p:tgtEl>
+                                        <p:attrNameLst>
+                                          <p:attrName>style.visibility</p:attrName>
+                                        </p:attrNameLst>
+                                      </p:cBhvr>
+                                      <p:to>
+                                        <p:strVal val="visible"/>
+                                      </p:to>
+                                    </p:set>
+                                    <p:animEffect transition="in" filter="fade">
+                                      <p:cBhvr>
+                                        <p:cTn id="11" dur="1000"/>
+                                        <p:tgtEl>
+                                          <p:spTgt spid="3">
+                                            <p:txEl>
+                                              <p:pRg st="0" end="0"/>
+                                            </p:txEl>
+                                          </p:spTgt>
+                                        </p:tgtEl>
+                                      </p:cBhvr>
+                                    </p:animEffect>
+                                    <p:anim calcmode="lin" valueType="num">
+                                      <p:cBhvr>
+                                        <p:cTn id="12" dur="1000" fill="hold"/>
+                                        <p:tgtEl>
+                                          <p:spTgt spid="3">
+                                            <p:txEl>
+                                              <p:pRg st="0" end="0"/>
+                                            </p:txEl>
+                                          </p:spTgt>
+                                        </p:tgtEl>
+                                        <p:attrNameLst>
+                                          <p:attrName>ppt_x</p:attrName>
+                                        </p:attrNameLst>
+                                      </p:cBhvr>
+                                      <p:tavLst>
+                                        <p:tav tm="0">
+                                          <p:val>
+                                            <p:strVal val="#ppt_x"/>
+                                          </p:val>
+                                        </p:tav>
+                                        <p:tav tm="100000">
+                                          <p:val>
+                                            <p:strVal val="#ppt_x"/>
+                                          </p:val>
+                                        </p:tav>
+                                      </p:tavLst>
+                                    </p:anim>
+                                    <p:anim calcmode="lin" valueType="num">
+                                      <p:cBhvr>
+                                        <p:cTn id="13" dur="1000" fill="hold"/>
+                                        <p:tgtEl>
+                                          <p:spTgt spid="3">
+                                            <p:txEl>
+                                              <p:pRg st="0" end="0"/>
+                                            </p:txEl>
+                                          </p:spTgt>
+                                        </p:tgtEl>
+                                        <p:attrNameLst>
+                                          <p:attrName>ppt_y</p:attrName>
+                                        </p:attrNameLst>
+                                      </p:cBhvr>
+                                      <p:tavLst>
+                                        <p:tav tm="0">
+                                          <p:val>
+                                            <p:strVal val="#ppt_y+.1"/>
+                                          </p:val>
+                                        </p:tav>
+                                        <p:tav tm="100000">
+                                          <p:val>
+                                            <p:strVal val="#ppt_y"/>
+                                          </p:val>
+                                        </p:tav>
+                                      </p:tavLst>
+                                    </p:anim>
+                                  </p:childTnLst>
+                                </p:cTn>
+                              </p:par>
+                            </p:childTnLst>
+                          </p:cTn>
+                        </p:par>
+                      </p:childTnLst>
+                    </p:cTn>
+                  </p:par>
+                </p:childTnLst>
+              </p:cTn>
+              <p:prevCondLst>
+                <p:cond evt="onPrev" delay="0">
+                  <p:tgtEl>
+                    <p:sldTgt/>
+                  </p:tgtEl>
+                </p:cond>
+              </p:prevCondLst>
+              <p:nextCondLst>
+                <p:cond evt="onNext" delay="0">
+                  <p:tgtEl>
+                    <p:sldTgt/>
+                  </p:tgtEl>
+                </p:cond>
+              </p:nextCondLst>
+            </p:seq>
+          </p:childTnLst>
+        </p:cTn>
+      </p:par>
+    </p:tnLst>
+    <p:bldLst>
+      <p:bldP spid="2" grpId="0"/>
+      <p:bldP spid="3" grpId="0" build="p"/>
+    </p:bldLst>
+  </p:timing>
+</p:sld>
+</file>
+
+<file path=ppt/slides/slide3.xml><?xml version="1.0" encoding="utf-8"?>
+<p:sld xmlns:a="http://schemas.openxmlformats.org/drawingml/2006/main" xmlns:r="http://schemas.openxmlformats.org/officeDocument/2006/relationships" xmlns:p="http://schemas.openxmlformats.org/presentationml/2006/main">
+  <p:cSld>
+    <p:spTree>
+      <p:nvGrpSpPr>
+        <p:cNvPr id="1" name=""/>
+        <p:cNvGrpSpPr/>
+        <p:nvPr/>
+      </p:nvGrpSpPr>
+      <p:grpSpPr>
+        <a:xfrm>
+          <a:off x="0" y="0"/>
+          <a:ext cx="0" cy="0"/>
+          <a:chOff x="0" y="0"/>
+          <a:chExt cx="0" cy="0"/>
+        </a:xfrm>
+      </p:grpSpPr>
+      <p:sp>
+        <p:nvSpPr>
+          <p:cNvPr id="2" name="Title 1"/>
+          <p:cNvSpPr>
+            <a:spLocks noGrp="1"/>
+          </p:cNvSpPr>
+          <p:nvPr>
+            <p:ph type="title"/>
+          </p:nvPr>
+        </p:nvSpPr>
+        <p:spPr/>
+        <p:txBody>
+          <a:bodyPr>
+            <a:normAutofit/>
+          </a:bodyPr>
+          <a:lstStyle/>
+          <a:p>
+            <a:r>
+              <a:rPr lang="fr-FR" sz="4800" b="1" dirty="0" smtClean="0">
+                <a:solidFill>
+                  <a:schemeClr val="accent5">
+                    <a:lumMod val="50000"/>
+                  </a:schemeClr>
+                </a:solidFill>
+                <a:latin typeface="Calibri" panose="020F0502020204030204" pitchFamily="34" charset="0"/>
+              </a:rPr>
+              <a:t>Objectif</a:t>
+            </a:r>
+            <a:endParaRPr lang="fr-FR" sz="4800" b="1" dirty="0">
+              <a:solidFill>
+                <a:schemeClr val="accent5">
+                  <a:lumMod val="50000"/>
+                </a:schemeClr>
+              </a:solidFill>
+              <a:latin typeface="Calibri" panose="020F0502020204030204" pitchFamily="34" charset="0"/>
+            </a:endParaRPr>
+          </a:p>
+        </p:txBody>
+      </p:sp>
+      <p:sp>
+        <p:nvSpPr>
+          <p:cNvPr id="3" name="Content Placeholder 2"/>
+          <p:cNvSpPr>
+            <a:spLocks noGrp="1"/>
+          </p:cNvSpPr>
+          <p:nvPr>
+            <p:ph idx="1"/>
+          </p:nvPr>
+        </p:nvSpPr>
+        <p:spPr/>
+        <p:txBody>
+          <a:bodyPr/>
+          <a:lstStyle/>
+          <a:p>
+            <a:r>
+              <a:rPr lang="fr-FR" dirty="0" smtClean="0"/>
+              <a:t>L'objectif de « CarsLocator</a:t>
+            </a:r>
+            <a:r>
+              <a:rPr lang="fr-FR" dirty="0"/>
+              <a:t> » </a:t>
+            </a:r>
+            <a:r>
+              <a:rPr lang="fr-FR" dirty="0" smtClean="0"/>
+              <a:t>est </a:t>
+            </a:r>
+            <a:r>
+              <a:rPr lang="fr-FR" dirty="0"/>
+              <a:t>de concevoir une application dédiée au téléphone mobile, </a:t>
+            </a:r>
+            <a:r>
+              <a:rPr lang="fr-FR" dirty="0" smtClean="0"/>
+              <a:t>dotée </a:t>
+            </a:r>
+            <a:r>
+              <a:rPr lang="fr-FR" dirty="0"/>
+              <a:t>de la plateforme Android, permettant à son propriétaire d’assurer le suivi fiable d’un grand nombre de véhicules, grâce aux outils et techniques de géolocalisation et d'orientation offerts par cette plateforme.</a:t>
+            </a:r>
+          </a:p>
+        </p:txBody>
+      </p:sp>
+    </p:spTree>
+    <p:extLst>
+      <p:ext uri="{BB962C8B-B14F-4D97-AF65-F5344CB8AC3E}">
+        <p14:creationId xmlns:p14="http://schemas.microsoft.com/office/powerpoint/2010/main" val="3518750671"/>
+      </p:ext>
+    </p:extLst>
+  </p:cSld>
+  <p:clrMapOvr>
+    <a:masterClrMapping/>
+  </p:clrMapOvr>
+  <p:timing>
+    <p:tnLst>
+      <p:par>
+        <p:cTn id="1" dur="indefinite" restart="never" nodeType="tmRoot">
+          <p:childTnLst>
+            <p:seq concurrent="1" nextAc="seek">
+              <p:cTn id="2" dur="indefinite" nodeType="mainSeq">
+                <p:childTnLst>
+                  <p:par>
+                    <p:cTn id="3" fill="hold">
+                      <p:stCondLst>
+                        <p:cond delay="indefinite"/>
+                      </p:stCondLst>
+                      <p:childTnLst>
+                        <p:par>
+                          <p:cTn id="4" fill="hold">
+                            <p:stCondLst>
+                              <p:cond delay="0"/>
+                            </p:stCondLst>
+                            <p:childTnLst>
+                              <p:par>
+                                <p:cTn id="5" presetID="6" presetClass="entr" presetSubtype="16" fill="hold" grpId="0" nodeType="clickEffect">
+                                  <p:stCondLst>
+                                    <p:cond delay="0"/>
+                                  </p:stCondLst>
+                                  <p:childTnLst>
+                                    <p:set>
+                                      <p:cBhvr>
+                                        <p:cTn id="6" dur="1" fill="hold">
+                                          <p:stCondLst>
+                                            <p:cond delay="0"/>
+                                          </p:stCondLst>
+                                        </p:cTn>
+                                        <p:tgtEl>
+                                          <p:spTgt spid="2"/>
                                         </p:tgtEl>
                                         <p:attrNameLst>
                                           <p:attrName>style.visibility</p:attrName>
@@ -7081,9 +6800,9 @@
                                     </p:set>
                                     <p:animEffect transition="in" filter="circle(in)">
                                       <p:cBhvr>
-                                        <p:cTn id="27" dur="2000"/>
-                                        <p:tgtEl>
-                                          <p:spTgt spid="9"/>
+                                        <p:cTn id="7" dur="2000"/>
+                                        <p:tgtEl>
+                                          <p:spTgt spid="2"/>
                                         </p:tgtEl>
                                       </p:cBhvr>
                                     </p:animEffect>
@@ -7097,32 +6816,36 @@
                     </p:cTn>
                   </p:par>
                   <p:par>
-                    <p:cTn id="28" fill="hold">
+                    <p:cTn id="8" fill="hold">
                       <p:stCondLst>
                         <p:cond delay="indefinite"/>
                       </p:stCondLst>
                       <p:childTnLst>
                         <p:par>
-                          <p:cTn id="29" fill="hold">
+                          <p:cTn id="9" fill="hold">
                             <p:stCondLst>
                               <p:cond delay="0"/>
                             </p:stCondLst>
                             <p:childTnLst>
                               <p:par>
-                                <p:cTn id="30" presetID="16" presetClass="entr" presetSubtype="21" fill="hold" nodeType="clickEffect">
+                                <p:cTn id="10" presetID="26" presetClass="entr" presetSubtype="0" fill="hold" grpId="0" nodeType="clickEffect">
                                   <p:stCondLst>
                                     <p:cond delay="0"/>
                                   </p:stCondLst>
                                   <p:childTnLst>
                                     <p:set>
                                       <p:cBhvr>
-                                        <p:cTn id="31" dur="1" fill="hold">
+                                        <p:cTn id="11" dur="1" fill="hold">
                                           <p:stCondLst>
                                             <p:cond delay="0"/>
                                           </p:stCondLst>
                                         </p:cTn>
                                         <p:tgtEl>
-                                          <p:spTgt spid="10"/>
+                                          <p:spTgt spid="3">
+                                            <p:txEl>
+                                              <p:pRg st="0" end="0"/>
+                                            </p:txEl>
+                                          </p:spTgt>
                                         </p:tgtEl>
                                         <p:attrNameLst>
                                           <p:attrName>style.visibility</p:attrName>
@@ -7132,11 +6855,577 @@
                                         <p:strVal val="visible"/>
                                       </p:to>
                                     </p:set>
-                                    <p:animEffect transition="in" filter="barn(inVertical)">
+                                    <p:animEffect transition="in" filter="wipe(down)">
                                       <p:cBhvr>
-                                        <p:cTn id="32" dur="500"/>
-                                        <p:tgtEl>
-                                          <p:spTgt spid="10"/>
+                                        <p:cTn id="12" dur="580">
+                                          <p:stCondLst>
+                                            <p:cond delay="0"/>
+                                          </p:stCondLst>
+                                        </p:cTn>
+                                        <p:tgtEl>
+                                          <p:spTgt spid="3">
+                                            <p:txEl>
+                                              <p:pRg st="0" end="0"/>
+                                            </p:txEl>
+                                          </p:spTgt>
+                                        </p:tgtEl>
+                                      </p:cBhvr>
+                                    </p:animEffect>
+                                    <p:anim calcmode="lin" valueType="num">
+                                      <p:cBhvr>
+                                        <p:cTn id="13" dur="1822" tmFilter="0,0; 0.14,0.36; 0.43,0.73; 0.71,0.91; 1.0,1.0">
+                                          <p:stCondLst>
+                                            <p:cond delay="0"/>
+                                          </p:stCondLst>
+                                        </p:cTn>
+                                        <p:tgtEl>
+                                          <p:spTgt spid="3">
+                                            <p:txEl>
+                                              <p:pRg st="0" end="0"/>
+                                            </p:txEl>
+                                          </p:spTgt>
+                                        </p:tgtEl>
+                                        <p:attrNameLst>
+                                          <p:attrName>ppt_x</p:attrName>
+                                        </p:attrNameLst>
+                                      </p:cBhvr>
+                                      <p:tavLst>
+                                        <p:tav tm="0">
+                                          <p:val>
+                                            <p:strVal val="#ppt_x-0.25"/>
+                                          </p:val>
+                                        </p:tav>
+                                        <p:tav tm="100000">
+                                          <p:val>
+                                            <p:strVal val="#ppt_x"/>
+                                          </p:val>
+                                        </p:tav>
+                                      </p:tavLst>
+                                    </p:anim>
+                                    <p:anim calcmode="lin" valueType="num">
+                                      <p:cBhvr>
+                                        <p:cTn id="14" dur="664" tmFilter="0.0,0.0; 0.25,0.07; 0.50,0.2; 0.75,0.467; 1.0,1.0">
+                                          <p:stCondLst>
+                                            <p:cond delay="0"/>
+                                          </p:stCondLst>
+                                        </p:cTn>
+                                        <p:tgtEl>
+                                          <p:spTgt spid="3">
+                                            <p:txEl>
+                                              <p:pRg st="0" end="0"/>
+                                            </p:txEl>
+                                          </p:spTgt>
+                                        </p:tgtEl>
+                                        <p:attrNameLst>
+                                          <p:attrName>ppt_y</p:attrName>
+                                        </p:attrNameLst>
+                                      </p:cBhvr>
+                                      <p:tavLst>
+                                        <p:tav tm="0" fmla="#ppt_y-sin(pi*$)/3">
+                                          <p:val>
+                                            <p:fltVal val="0.5"/>
+                                          </p:val>
+                                        </p:tav>
+                                        <p:tav tm="100000">
+                                          <p:val>
+                                            <p:fltVal val="1"/>
+                                          </p:val>
+                                        </p:tav>
+                                      </p:tavLst>
+                                    </p:anim>
+                                    <p:anim calcmode="lin" valueType="num">
+                                      <p:cBhvr>
+                                        <p:cTn id="15" dur="664" tmFilter="0, 0; 0.125,0.2665; 0.25,0.4; 0.375,0.465; 0.5,0.5;  0.625,0.535; 0.75,0.6; 0.875,0.7335; 1,1">
+                                          <p:stCondLst>
+                                            <p:cond delay="664"/>
+                                          </p:stCondLst>
+                                        </p:cTn>
+                                        <p:tgtEl>
+                                          <p:spTgt spid="3">
+                                            <p:txEl>
+                                              <p:pRg st="0" end="0"/>
+                                            </p:txEl>
+                                          </p:spTgt>
+                                        </p:tgtEl>
+                                        <p:attrNameLst>
+                                          <p:attrName>ppt_y</p:attrName>
+                                        </p:attrNameLst>
+                                      </p:cBhvr>
+                                      <p:tavLst>
+                                        <p:tav tm="0" fmla="#ppt_y-sin(pi*$)/9">
+                                          <p:val>
+                                            <p:fltVal val="0"/>
+                                          </p:val>
+                                        </p:tav>
+                                        <p:tav tm="100000">
+                                          <p:val>
+                                            <p:fltVal val="1"/>
+                                          </p:val>
+                                        </p:tav>
+                                      </p:tavLst>
+                                    </p:anim>
+                                    <p:anim calcmode="lin" valueType="num">
+                                      <p:cBhvr>
+                                        <p:cTn id="16" dur="332" tmFilter="0, 0; 0.125,0.2665; 0.25,0.4; 0.375,0.465; 0.5,0.5;  0.625,0.535; 0.75,0.6; 0.875,0.7335; 1,1">
+                                          <p:stCondLst>
+                                            <p:cond delay="1324"/>
+                                          </p:stCondLst>
+                                        </p:cTn>
+                                        <p:tgtEl>
+                                          <p:spTgt spid="3">
+                                            <p:txEl>
+                                              <p:pRg st="0" end="0"/>
+                                            </p:txEl>
+                                          </p:spTgt>
+                                        </p:tgtEl>
+                                        <p:attrNameLst>
+                                          <p:attrName>ppt_y</p:attrName>
+                                        </p:attrNameLst>
+                                      </p:cBhvr>
+                                      <p:tavLst>
+                                        <p:tav tm="0" fmla="#ppt_y-sin(pi*$)/27">
+                                          <p:val>
+                                            <p:fltVal val="0"/>
+                                          </p:val>
+                                        </p:tav>
+                                        <p:tav tm="100000">
+                                          <p:val>
+                                            <p:fltVal val="1"/>
+                                          </p:val>
+                                        </p:tav>
+                                      </p:tavLst>
+                                    </p:anim>
+                                    <p:anim calcmode="lin" valueType="num">
+                                      <p:cBhvr>
+                                        <p:cTn id="17" dur="164" tmFilter="0, 0; 0.125,0.2665; 0.25,0.4; 0.375,0.465; 0.5,0.5;  0.625,0.535; 0.75,0.6; 0.875,0.7335; 1,1">
+                                          <p:stCondLst>
+                                            <p:cond delay="1656"/>
+                                          </p:stCondLst>
+                                        </p:cTn>
+                                        <p:tgtEl>
+                                          <p:spTgt spid="3">
+                                            <p:txEl>
+                                              <p:pRg st="0" end="0"/>
+                                            </p:txEl>
+                                          </p:spTgt>
+                                        </p:tgtEl>
+                                        <p:attrNameLst>
+                                          <p:attrName>ppt_y</p:attrName>
+                                        </p:attrNameLst>
+                                      </p:cBhvr>
+                                      <p:tavLst>
+                                        <p:tav tm="0" fmla="#ppt_y-sin(pi*$)/81">
+                                          <p:val>
+                                            <p:fltVal val="0"/>
+                                          </p:val>
+                                        </p:tav>
+                                        <p:tav tm="100000">
+                                          <p:val>
+                                            <p:fltVal val="1"/>
+                                          </p:val>
+                                        </p:tav>
+                                      </p:tavLst>
+                                    </p:anim>
+                                    <p:animScale>
+                                      <p:cBhvr>
+                                        <p:cTn id="18" dur="26">
+                                          <p:stCondLst>
+                                            <p:cond delay="650"/>
+                                          </p:stCondLst>
+                                        </p:cTn>
+                                        <p:tgtEl>
+                                          <p:spTgt spid="3">
+                                            <p:txEl>
+                                              <p:pRg st="0" end="0"/>
+                                            </p:txEl>
+                                          </p:spTgt>
+                                        </p:tgtEl>
+                                      </p:cBhvr>
+                                      <p:to x="100000" y="60000"/>
+                                    </p:animScale>
+                                    <p:animScale>
+                                      <p:cBhvr>
+                                        <p:cTn id="19" dur="166" decel="50000">
+                                          <p:stCondLst>
+                                            <p:cond delay="676"/>
+                                          </p:stCondLst>
+                                        </p:cTn>
+                                        <p:tgtEl>
+                                          <p:spTgt spid="3">
+                                            <p:txEl>
+                                              <p:pRg st="0" end="0"/>
+                                            </p:txEl>
+                                          </p:spTgt>
+                                        </p:tgtEl>
+                                      </p:cBhvr>
+                                      <p:to x="100000" y="100000"/>
+                                    </p:animScale>
+                                    <p:animScale>
+                                      <p:cBhvr>
+                                        <p:cTn id="20" dur="26">
+                                          <p:stCondLst>
+                                            <p:cond delay="1312"/>
+                                          </p:stCondLst>
+                                        </p:cTn>
+                                        <p:tgtEl>
+                                          <p:spTgt spid="3">
+                                            <p:txEl>
+                                              <p:pRg st="0" end="0"/>
+                                            </p:txEl>
+                                          </p:spTgt>
+                                        </p:tgtEl>
+                                      </p:cBhvr>
+                                      <p:to x="100000" y="80000"/>
+                                    </p:animScale>
+                                    <p:animScale>
+                                      <p:cBhvr>
+                                        <p:cTn id="21" dur="166" decel="50000">
+                                          <p:stCondLst>
+                                            <p:cond delay="1338"/>
+                                          </p:stCondLst>
+                                        </p:cTn>
+                                        <p:tgtEl>
+                                          <p:spTgt spid="3">
+                                            <p:txEl>
+                                              <p:pRg st="0" end="0"/>
+                                            </p:txEl>
+                                          </p:spTgt>
+                                        </p:tgtEl>
+                                      </p:cBhvr>
+                                      <p:to x="100000" y="100000"/>
+                                    </p:animScale>
+                                    <p:animScale>
+                                      <p:cBhvr>
+                                        <p:cTn id="22" dur="26">
+                                          <p:stCondLst>
+                                            <p:cond delay="1642"/>
+                                          </p:stCondLst>
+                                        </p:cTn>
+                                        <p:tgtEl>
+                                          <p:spTgt spid="3">
+                                            <p:txEl>
+                                              <p:pRg st="0" end="0"/>
+                                            </p:txEl>
+                                          </p:spTgt>
+                                        </p:tgtEl>
+                                      </p:cBhvr>
+                                      <p:to x="100000" y="90000"/>
+                                    </p:animScale>
+                                    <p:animScale>
+                                      <p:cBhvr>
+                                        <p:cTn id="23" dur="166" decel="50000">
+                                          <p:stCondLst>
+                                            <p:cond delay="1668"/>
+                                          </p:stCondLst>
+                                        </p:cTn>
+                                        <p:tgtEl>
+                                          <p:spTgt spid="3">
+                                            <p:txEl>
+                                              <p:pRg st="0" end="0"/>
+                                            </p:txEl>
+                                          </p:spTgt>
+                                        </p:tgtEl>
+                                      </p:cBhvr>
+                                      <p:to x="100000" y="100000"/>
+                                    </p:animScale>
+                                    <p:animScale>
+                                      <p:cBhvr>
+                                        <p:cTn id="24" dur="26">
+                                          <p:stCondLst>
+                                            <p:cond delay="1808"/>
+                                          </p:stCondLst>
+                                        </p:cTn>
+                                        <p:tgtEl>
+                                          <p:spTgt spid="3">
+                                            <p:txEl>
+                                              <p:pRg st="0" end="0"/>
+                                            </p:txEl>
+                                          </p:spTgt>
+                                        </p:tgtEl>
+                                      </p:cBhvr>
+                                      <p:to x="100000" y="95000"/>
+                                    </p:animScale>
+                                    <p:animScale>
+                                      <p:cBhvr>
+                                        <p:cTn id="25" dur="166" decel="50000">
+                                          <p:stCondLst>
+                                            <p:cond delay="1834"/>
+                                          </p:stCondLst>
+                                        </p:cTn>
+                                        <p:tgtEl>
+                                          <p:spTgt spid="3">
+                                            <p:txEl>
+                                              <p:pRg st="0" end="0"/>
+                                            </p:txEl>
+                                          </p:spTgt>
+                                        </p:tgtEl>
+                                      </p:cBhvr>
+                                      <p:to x="100000" y="100000"/>
+                                    </p:animScale>
+                                  </p:childTnLst>
+                                </p:cTn>
+                              </p:par>
+                            </p:childTnLst>
+                          </p:cTn>
+                        </p:par>
+                      </p:childTnLst>
+                    </p:cTn>
+                  </p:par>
+                </p:childTnLst>
+              </p:cTn>
+              <p:prevCondLst>
+                <p:cond evt="onPrev" delay="0">
+                  <p:tgtEl>
+                    <p:sldTgt/>
+                  </p:tgtEl>
+                </p:cond>
+              </p:prevCondLst>
+              <p:nextCondLst>
+                <p:cond evt="onNext" delay="0">
+                  <p:tgtEl>
+                    <p:sldTgt/>
+                  </p:tgtEl>
+                </p:cond>
+              </p:nextCondLst>
+            </p:seq>
+          </p:childTnLst>
+        </p:cTn>
+      </p:par>
+    </p:tnLst>
+    <p:bldLst>
+      <p:bldP spid="2" grpId="0"/>
+      <p:bldP spid="3" grpId="0" build="p"/>
+    </p:bldLst>
+  </p:timing>
+</p:sld>
+</file>
+
+<file path=ppt/slides/slide4.xml><?xml version="1.0" encoding="utf-8"?>
+<p:sld xmlns:a="http://schemas.openxmlformats.org/drawingml/2006/main" xmlns:r="http://schemas.openxmlformats.org/officeDocument/2006/relationships" xmlns:p="http://schemas.openxmlformats.org/presentationml/2006/main">
+  <p:cSld>
+    <p:spTree>
+      <p:nvGrpSpPr>
+        <p:cNvPr id="1" name=""/>
+        <p:cNvGrpSpPr/>
+        <p:nvPr/>
+      </p:nvGrpSpPr>
+      <p:grpSpPr>
+        <a:xfrm>
+          <a:off x="0" y="0"/>
+          <a:ext cx="0" cy="0"/>
+          <a:chOff x="0" y="0"/>
+          <a:chExt cx="0" cy="0"/>
+        </a:xfrm>
+      </p:grpSpPr>
+      <p:sp>
+        <p:nvSpPr>
+          <p:cNvPr id="2" name="Title 1"/>
+          <p:cNvSpPr>
+            <a:spLocks noGrp="1"/>
+          </p:cNvSpPr>
+          <p:nvPr>
+            <p:ph type="title"/>
+          </p:nvPr>
+        </p:nvSpPr>
+        <p:spPr/>
+        <p:txBody>
+          <a:bodyPr/>
+          <a:lstStyle/>
+          <a:p>
+            <a:r>
+              <a:rPr lang="fr-FR" b="1" dirty="0" smtClean="0">
+                <a:solidFill>
+                  <a:schemeClr val="accent5">
+                    <a:lumMod val="50000"/>
+                  </a:schemeClr>
+                </a:solidFill>
+                <a:latin typeface="Calibri" panose="020F0502020204030204" pitchFamily="34" charset="0"/>
+              </a:rPr>
+              <a:t>Fonctionnalités</a:t>
+            </a:r>
+            <a:endParaRPr lang="fr-FR" dirty="0"/>
+          </a:p>
+        </p:txBody>
+      </p:sp>
+      <p:sp>
+        <p:nvSpPr>
+          <p:cNvPr id="3" name="Content Placeholder 2"/>
+          <p:cNvSpPr>
+            <a:spLocks noGrp="1"/>
+          </p:cNvSpPr>
+          <p:nvPr>
+            <p:ph idx="1"/>
+          </p:nvPr>
+        </p:nvSpPr>
+        <p:spPr>
+          <a:xfrm>
+            <a:off x="1484310" y="2438399"/>
+            <a:ext cx="10018713" cy="3124201"/>
+          </a:xfrm>
+        </p:spPr>
+        <p:txBody>
+          <a:bodyPr>
+            <a:normAutofit/>
+          </a:bodyPr>
+          <a:lstStyle/>
+          <a:p>
+            <a:endParaRPr lang="fr-FR" dirty="0" smtClean="0"/>
+          </a:p>
+          <a:p>
+            <a:r>
+              <a:rPr lang="fr-FR" dirty="0" smtClean="0"/>
+              <a:t>Définir des voyages (trajet le plus court + véhicule + chauffeur)</a:t>
+            </a:r>
+          </a:p>
+          <a:p>
+            <a:r>
+              <a:rPr lang="fr-FR" dirty="0"/>
+              <a:t>La localisation se fait via des smartphones donnés aux chauffeurs en utilisant le GPRS; ou bien via des appareils GPS fixés sur </a:t>
+            </a:r>
+            <a:r>
+              <a:rPr lang="fr-FR" dirty="0" smtClean="0"/>
+              <a:t>véhicule</a:t>
+            </a:r>
+            <a:endParaRPr lang="fr-FR" dirty="0"/>
+          </a:p>
+          <a:p>
+            <a:r>
+              <a:rPr lang="fr-FR" dirty="0" smtClean="0"/>
+              <a:t>Une </a:t>
+            </a:r>
+            <a:r>
+              <a:rPr lang="fr-FR" dirty="0"/>
+              <a:t>fois un véhicule est hors zone, l'application se charge </a:t>
+            </a:r>
+            <a:r>
+              <a:rPr lang="fr-FR" dirty="0" smtClean="0"/>
+              <a:t>d’envoyer </a:t>
+            </a:r>
+            <a:r>
+              <a:rPr lang="fr-FR" dirty="0"/>
+              <a:t>un warning au chauffeur et </a:t>
+            </a:r>
+            <a:r>
+              <a:rPr lang="fr-FR" dirty="0" smtClean="0"/>
+              <a:t>en notifier </a:t>
+            </a:r>
+            <a:r>
+              <a:rPr lang="fr-FR" dirty="0"/>
+              <a:t>le </a:t>
+            </a:r>
+            <a:r>
+              <a:rPr lang="fr-FR" dirty="0" smtClean="0"/>
+              <a:t>chef.</a:t>
+            </a:r>
+            <a:endParaRPr lang="fr-FR" dirty="0"/>
+          </a:p>
+        </p:txBody>
+      </p:sp>
+    </p:spTree>
+    <p:extLst>
+      <p:ext uri="{BB962C8B-B14F-4D97-AF65-F5344CB8AC3E}">
+        <p14:creationId xmlns:p14="http://schemas.microsoft.com/office/powerpoint/2010/main" val="2965020564"/>
+      </p:ext>
+    </p:extLst>
+  </p:cSld>
+  <p:clrMapOvr>
+    <a:masterClrMapping/>
+  </p:clrMapOvr>
+  <p:timing>
+    <p:tnLst>
+      <p:par>
+        <p:cTn id="1" dur="indefinite" restart="never" nodeType="tmRoot">
+          <p:childTnLst>
+            <p:seq concurrent="1" nextAc="seek">
+              <p:cTn id="2" dur="indefinite" nodeType="mainSeq">
+                <p:childTnLst>
+                  <p:par>
+                    <p:cTn id="3" fill="hold">
+                      <p:stCondLst>
+                        <p:cond delay="indefinite"/>
+                      </p:stCondLst>
+                      <p:childTnLst>
+                        <p:par>
+                          <p:cTn id="4" fill="hold">
+                            <p:stCondLst>
+                              <p:cond delay="0"/>
+                            </p:stCondLst>
+                            <p:childTnLst>
+                              <p:par>
+                                <p:cTn id="5" presetID="8" presetClass="emph" presetSubtype="0" fill="hold" grpId="0" nodeType="clickEffect">
+                                  <p:stCondLst>
+                                    <p:cond delay="0"/>
+                                  </p:stCondLst>
+                                  <p:childTnLst>
+                                    <p:animRot by="21600000">
+                                      <p:cBhvr>
+                                        <p:cTn id="6" dur="2000" fill="hold"/>
+                                        <p:tgtEl>
+                                          <p:spTgt spid="2"/>
+                                        </p:tgtEl>
+                                        <p:attrNameLst>
+                                          <p:attrName>r</p:attrName>
+                                        </p:attrNameLst>
+                                      </p:cBhvr>
+                                    </p:animRot>
+                                  </p:childTnLst>
+                                </p:cTn>
+                              </p:par>
+                            </p:childTnLst>
+                          </p:cTn>
+                        </p:par>
+                      </p:childTnLst>
+                    </p:cTn>
+                  </p:par>
+                  <p:par>
+                    <p:cTn id="7" fill="hold">
+                      <p:stCondLst>
+                        <p:cond delay="indefinite"/>
+                      </p:stCondLst>
+                      <p:childTnLst>
+                        <p:par>
+                          <p:cTn id="8" fill="hold">
+                            <p:stCondLst>
+                              <p:cond delay="0"/>
+                            </p:stCondLst>
+                            <p:childTnLst>
+                              <p:par>
+                                <p:cTn id="9" presetID="21" presetClass="entr" presetSubtype="1" fill="hold" grpId="0" nodeType="clickEffect">
+                                  <p:stCondLst>
+                                    <p:cond delay="0"/>
+                                  </p:stCondLst>
+                                  <p:childTnLst>
+                                    <p:set>
+                                      <p:cBhvr>
+                                        <p:cTn id="10" dur="1" fill="hold">
+                                          <p:stCondLst>
+                                            <p:cond delay="0"/>
+                                          </p:stCondLst>
+                                        </p:cTn>
+                                        <p:tgtEl>
+                                          <p:spTgt spid="3">
+                                            <p:txEl>
+                                              <p:pRg st="1" end="1"/>
+                                            </p:txEl>
+                                          </p:spTgt>
+                                        </p:tgtEl>
+                                        <p:attrNameLst>
+                                          <p:attrName>style.visibility</p:attrName>
+                                        </p:attrNameLst>
+                                      </p:cBhvr>
+                                      <p:to>
+                                        <p:strVal val="visible"/>
+                                      </p:to>
+                                    </p:set>
+                                    <p:animEffect transition="in" filter="wheel(1)">
+                                      <p:cBhvr>
+                                        <p:cTn id="11" dur="2000"/>
+                                        <p:tgtEl>
+                                          <p:spTgt spid="3">
+                                            <p:txEl>
+                                              <p:pRg st="1" end="1"/>
+                                            </p:txEl>
+                                          </p:spTgt>
                                         </p:tgtEl>
                                       </p:cBhvr>
                                     </p:animEffect>
@@ -7150,32 +7439,36 @@
                     </p:cTn>
                   </p:par>
                   <p:par>
-                    <p:cTn id="33" fill="hold">
+                    <p:cTn id="12" fill="hold">
                       <p:stCondLst>
                         <p:cond delay="indefinite"/>
                       </p:stCondLst>
                       <p:childTnLst>
                         <p:par>
-                          <p:cTn id="34" fill="hold">
+                          <p:cTn id="13" fill="hold">
                             <p:stCondLst>
                               <p:cond delay="0"/>
                             </p:stCondLst>
                             <p:childTnLst>
                               <p:par>
-                                <p:cTn id="35" presetID="31" presetClass="entr" presetSubtype="0" fill="hold" nodeType="clickEffect">
+                                <p:cTn id="14" presetID="21" presetClass="entr" presetSubtype="1" fill="hold" grpId="0" nodeType="clickEffect">
                                   <p:stCondLst>
                                     <p:cond delay="0"/>
                                   </p:stCondLst>
                                   <p:childTnLst>
                                     <p:set>
                                       <p:cBhvr>
-                                        <p:cTn id="36" dur="1" fill="hold">
+                                        <p:cTn id="15" dur="1" fill="hold">
                                           <p:stCondLst>
                                             <p:cond delay="0"/>
                                           </p:stCondLst>
                                         </p:cTn>
                                         <p:tgtEl>
-                                          <p:spTgt spid="11"/>
+                                          <p:spTgt spid="3">
+                                            <p:txEl>
+                                              <p:pRg st="2" end="2"/>
+                                            </p:txEl>
+                                          </p:spTgt>
                                         </p:tgtEl>
                                         <p:attrNameLst>
                                           <p:attrName>style.visibility</p:attrName>
@@ -7185,80 +7478,76 @@
                                         <p:strVal val="visible"/>
                                       </p:to>
                                     </p:set>
-                                    <p:anim calcmode="lin" valueType="num">
+                                    <p:animEffect transition="in" filter="wheel(1)">
                                       <p:cBhvr>
-                                        <p:cTn id="37" dur="1000" fill="hold"/>
-                                        <p:tgtEl>
-                                          <p:spTgt spid="11"/>
+                                        <p:cTn id="16" dur="2000"/>
+                                        <p:tgtEl>
+                                          <p:spTgt spid="3">
+                                            <p:txEl>
+                                              <p:pRg st="2" end="2"/>
+                                            </p:txEl>
+                                          </p:spTgt>
+                                        </p:tgtEl>
+                                      </p:cBhvr>
+                                    </p:animEffect>
+                                  </p:childTnLst>
+                                </p:cTn>
+                              </p:par>
+                            </p:childTnLst>
+                          </p:cTn>
+                        </p:par>
+                      </p:childTnLst>
+                    </p:cTn>
+                  </p:par>
+                  <p:par>
+                    <p:cTn id="17" fill="hold">
+                      <p:stCondLst>
+                        <p:cond delay="indefinite"/>
+                      </p:stCondLst>
+                      <p:childTnLst>
+                        <p:par>
+                          <p:cTn id="18" fill="hold">
+                            <p:stCondLst>
+                              <p:cond delay="0"/>
+                            </p:stCondLst>
+                            <p:childTnLst>
+                              <p:par>
+                                <p:cTn id="19" presetID="21" presetClass="entr" presetSubtype="1" fill="hold" grpId="0" nodeType="clickEffect">
+                                  <p:stCondLst>
+                                    <p:cond delay="0"/>
+                                  </p:stCondLst>
+                                  <p:childTnLst>
+                                    <p:set>
+                                      <p:cBhvr>
+                                        <p:cTn id="20" dur="1" fill="hold">
+                                          <p:stCondLst>
+                                            <p:cond delay="0"/>
+                                          </p:stCondLst>
+                                        </p:cTn>
+                                        <p:tgtEl>
+                                          <p:spTgt spid="3">
+                                            <p:txEl>
+                                              <p:pRg st="3" end="3"/>
+                                            </p:txEl>
+                                          </p:spTgt>
                                         </p:tgtEl>
                                         <p:attrNameLst>
-                                          <p:attrName>ppt_w</p:attrName>
+                                          <p:attrName>style.visibility</p:attrName>
                                         </p:attrNameLst>
                                       </p:cBhvr>
-                                      <p:tavLst>
-                                        <p:tav tm="0">
-                                          <p:val>
-                                            <p:fltVal val="0"/>
-                                          </p:val>
-                                        </p:tav>
-                                        <p:tav tm="100000">
-                                          <p:val>
-                                            <p:strVal val="#ppt_w"/>
-                                          </p:val>
-                                        </p:tav>
-                                      </p:tavLst>
-                                    </p:anim>
-                                    <p:anim calcmode="lin" valueType="num">
+                                      <p:to>
+                                        <p:strVal val="visible"/>
+                                      </p:to>
+                                    </p:set>
+                                    <p:animEffect transition="in" filter="wheel(1)">
                                       <p:cBhvr>
-                                        <p:cTn id="38" dur="1000" fill="hold"/>
-                                        <p:tgtEl>
-                                          <p:spTgt spid="11"/>
-                                        </p:tgtEl>
-                                        <p:attrNameLst>
-                                          <p:attrName>ppt_h</p:attrName>
-                                        </p:attrNameLst>
-                                      </p:cBhvr>
-                                      <p:tavLst>
-                                        <p:tav tm="0">
-                                          <p:val>
-                                            <p:fltVal val="0"/>
-                                          </p:val>
-                                        </p:tav>
-                                        <p:tav tm="100000">
-                                          <p:val>
-                                            <p:strVal val="#ppt_h"/>
-                                          </p:val>
-                                        </p:tav>
-                                      </p:tavLst>
-                                    </p:anim>
-                                    <p:anim calcmode="lin" valueType="num">
-                                      <p:cBhvr>
-                                        <p:cTn id="39" dur="1000" fill="hold"/>
-                                        <p:tgtEl>
-                                          <p:spTgt spid="11"/>
-                                        </p:tgtEl>
-                                        <p:attrNameLst>
-                                          <p:attrName>style.rotation</p:attrName>
-                                        </p:attrNameLst>
-                                      </p:cBhvr>
-                                      <p:tavLst>
-                                        <p:tav tm="0">
-                                          <p:val>
-                                            <p:fltVal val="90"/>
-                                          </p:val>
-                                        </p:tav>
-                                        <p:tav tm="100000">
-                                          <p:val>
-                                            <p:fltVal val="0"/>
-                                          </p:val>
-                                        </p:tav>
-                                      </p:tavLst>
-                                    </p:anim>
-                                    <p:animEffect transition="in" filter="fade">
-                                      <p:cBhvr>
-                                        <p:cTn id="40" dur="1000"/>
-                                        <p:tgtEl>
-                                          <p:spTgt spid="11"/>
+                                        <p:cTn id="21" dur="2000"/>
+                                        <p:tgtEl>
+                                          <p:spTgt spid="3">
+                                            <p:txEl>
+                                              <p:pRg st="3" end="3"/>
+                                            </p:txEl>
+                                          </p:spTgt>
                                         </p:tgtEl>
                                       </p:cBhvr>
                                     </p:animEffect>
@@ -7292,11 +7581,15 @@
         </p:cTn>
       </p:par>
     </p:tnLst>
+    <p:bldLst>
+      <p:bldP spid="2" grpId="0"/>
+      <p:bldP spid="3" grpId="0" build="p"/>
+    </p:bldLst>
   </p:timing>
 </p:sld>
 </file>
 
-<file path=ppt/slides/slide3.xml><?xml version="1.0" encoding="utf-8"?>
+<file path=ppt/slides/slide5.xml><?xml version="1.0" encoding="utf-8"?>
 <p:sld xmlns:a="http://schemas.openxmlformats.org/drawingml/2006/main" xmlns:r="http://schemas.openxmlformats.org/officeDocument/2006/relationships" xmlns:p="http://schemas.openxmlformats.org/presentationml/2006/main">
   <p:cSld>
     <p:spTree>
@@ -7315,29 +7608,1794 @@
       </p:grpSpPr>
       <p:sp>
         <p:nvSpPr>
+          <p:cNvPr id="2" name="Title 1"/>
+          <p:cNvSpPr>
+            <a:spLocks noGrp="1"/>
+          </p:cNvSpPr>
+          <p:nvPr>
+            <p:ph type="title"/>
+          </p:nvPr>
+        </p:nvSpPr>
+        <p:spPr/>
+        <p:txBody>
+          <a:bodyPr/>
+          <a:lstStyle/>
+          <a:p>
+            <a:r>
+              <a:rPr lang="fr-FR" b="1" dirty="0" smtClean="0">
+                <a:solidFill>
+                  <a:schemeClr val="accent5">
+                    <a:lumMod val="50000"/>
+                  </a:schemeClr>
+                </a:solidFill>
+                <a:latin typeface="Calibri" panose="020F0502020204030204" pitchFamily="34" charset="0"/>
+              </a:rPr>
+              <a:t>Types de trajets</a:t>
+            </a:r>
+            <a:endParaRPr lang="fr-FR" dirty="0"/>
+          </a:p>
+        </p:txBody>
+      </p:sp>
+      <p:sp>
+        <p:nvSpPr>
           <p:cNvPr id="3" name="Content Placeholder 2"/>
           <p:cNvSpPr>
             <a:spLocks noGrp="1"/>
           </p:cNvSpPr>
           <p:nvPr>
             <p:ph idx="1"/>
+          </p:nvPr>
+        </p:nvSpPr>
+        <p:spPr/>
+        <p:txBody>
+          <a:bodyPr/>
+          <a:lstStyle/>
+          <a:p>
+            <a:pPr marL="0" indent="0">
+              <a:buNone/>
+            </a:pPr>
+            <a:r>
+              <a:rPr lang="fr-FR" dirty="0"/>
+              <a:t> </a:t>
+            </a:r>
+          </a:p>
+        </p:txBody>
+      </p:sp>
+      <p:sp>
+        <p:nvSpPr>
+          <p:cNvPr id="5" name="Cloud 4"/>
+          <p:cNvSpPr/>
+          <p:nvPr/>
+        </p:nvSpPr>
+        <p:spPr>
+          <a:xfrm rot="1364827">
+            <a:off x="7052042" y="3841693"/>
+            <a:ext cx="3130042" cy="2193832"/>
+          </a:xfrm>
+          <a:prstGeom prst="cloud">
+            <a:avLst/>
+          </a:prstGeom>
+        </p:spPr>
+        <p:style>
+          <a:lnRef idx="3">
+            <a:schemeClr val="lt1"/>
+          </a:lnRef>
+          <a:fillRef idx="1">
+            <a:schemeClr val="accent5"/>
+          </a:fillRef>
+          <a:effectRef idx="1">
+            <a:schemeClr val="accent5"/>
+          </a:effectRef>
+          <a:fontRef idx="minor">
+            <a:schemeClr val="lt1"/>
+          </a:fontRef>
+        </p:style>
+        <p:txBody>
+          <a:bodyPr rtlCol="0" anchor="ctr"/>
+          <a:lstStyle/>
+          <a:p>
+            <a:pPr algn="ctr"/>
+            <a:r>
+              <a:rPr lang="fr-FR" sz="2800" b="1" dirty="0" smtClean="0">
+                <a:latin typeface="Calibri" panose="020F0502020204030204" pitchFamily="34" charset="0"/>
+              </a:rPr>
+              <a:t>Distribution</a:t>
+            </a:r>
+            <a:endParaRPr lang="fr-FR" b="1" dirty="0" smtClean="0">
+              <a:latin typeface="Calibri" panose="020F0502020204030204" pitchFamily="34" charset="0"/>
+            </a:endParaRPr>
+          </a:p>
+          <a:p>
+            <a:pPr algn="ctr"/>
+            <a:endParaRPr lang="fr-FR" dirty="0"/>
+          </a:p>
+        </p:txBody>
+      </p:sp>
+      <p:sp>
+        <p:nvSpPr>
+          <p:cNvPr id="6" name="Chevron 5"/>
+          <p:cNvSpPr/>
+          <p:nvPr/>
+        </p:nvSpPr>
+        <p:spPr>
+          <a:xfrm rot="20099151">
+            <a:off x="2555836" y="2992461"/>
+            <a:ext cx="3510740" cy="1263142"/>
+          </a:xfrm>
+          <a:prstGeom prst="chevron">
+            <a:avLst/>
+          </a:prstGeom>
+        </p:spPr>
+        <p:style>
+          <a:lnRef idx="3">
+            <a:schemeClr val="lt1"/>
+          </a:lnRef>
+          <a:fillRef idx="1">
+            <a:schemeClr val="accent2"/>
+          </a:fillRef>
+          <a:effectRef idx="1">
+            <a:schemeClr val="accent2"/>
+          </a:effectRef>
+          <a:fontRef idx="minor">
+            <a:schemeClr val="lt1"/>
+          </a:fontRef>
+        </p:style>
+        <p:txBody>
+          <a:bodyPr rtlCol="0" anchor="ctr"/>
+          <a:lstStyle/>
+          <a:p>
+            <a:pPr algn="ctr"/>
+            <a:r>
+              <a:rPr lang="fr-FR" sz="2800" b="1" dirty="0" smtClean="0">
+                <a:solidFill>
+                  <a:schemeClr val="bg1"/>
+                </a:solidFill>
+                <a:latin typeface="Calibri" panose="020F0502020204030204" pitchFamily="34" charset="0"/>
+              </a:rPr>
+              <a:t>Livraison</a:t>
+            </a:r>
+            <a:endParaRPr lang="fr-FR" sz="2800" b="1" dirty="0">
+              <a:solidFill>
+                <a:schemeClr val="bg1"/>
+              </a:solidFill>
+              <a:latin typeface="Calibri" panose="020F0502020204030204" pitchFamily="34" charset="0"/>
+            </a:endParaRPr>
+          </a:p>
+        </p:txBody>
+      </p:sp>
+    </p:spTree>
+    <p:extLst>
+      <p:ext uri="{BB962C8B-B14F-4D97-AF65-F5344CB8AC3E}">
+        <p14:creationId xmlns:p14="http://schemas.microsoft.com/office/powerpoint/2010/main" val="335475367"/>
+      </p:ext>
+    </p:extLst>
+  </p:cSld>
+  <p:clrMapOvr>
+    <a:masterClrMapping/>
+  </p:clrMapOvr>
+  <p:timing>
+    <p:tnLst>
+      <p:par>
+        <p:cTn id="1" dur="indefinite" restart="never" nodeType="tmRoot">
+          <p:childTnLst>
+            <p:seq concurrent="1" nextAc="seek">
+              <p:cTn id="2" dur="indefinite" nodeType="mainSeq">
+                <p:childTnLst>
+                  <p:par>
+                    <p:cTn id="3" fill="hold">
+                      <p:stCondLst>
+                        <p:cond delay="indefinite"/>
+                      </p:stCondLst>
+                      <p:childTnLst>
+                        <p:par>
+                          <p:cTn id="4" fill="hold">
+                            <p:stCondLst>
+                              <p:cond delay="0"/>
+                            </p:stCondLst>
+                            <p:childTnLst>
+                              <p:par>
+                                <p:cTn id="5" presetID="6" presetClass="emph" presetSubtype="0" fill="hold" grpId="0" nodeType="clickEffect">
+                                  <p:stCondLst>
+                                    <p:cond delay="0"/>
+                                  </p:stCondLst>
+                                  <p:childTnLst>
+                                    <p:animScale>
+                                      <p:cBhvr>
+                                        <p:cTn id="6" dur="2000" fill="hold"/>
+                                        <p:tgtEl>
+                                          <p:spTgt spid="2"/>
+                                        </p:tgtEl>
+                                      </p:cBhvr>
+                                      <p:by x="150000" y="150000"/>
+                                    </p:animScale>
+                                  </p:childTnLst>
+                                </p:cTn>
+                              </p:par>
+                            </p:childTnLst>
+                          </p:cTn>
+                        </p:par>
+                      </p:childTnLst>
+                    </p:cTn>
+                  </p:par>
+                  <p:par>
+                    <p:cTn id="7" fill="hold">
+                      <p:stCondLst>
+                        <p:cond delay="indefinite"/>
+                      </p:stCondLst>
+                      <p:childTnLst>
+                        <p:par>
+                          <p:cTn id="8" fill="hold">
+                            <p:stCondLst>
+                              <p:cond delay="0"/>
+                            </p:stCondLst>
+                            <p:childTnLst>
+                              <p:par>
+                                <p:cTn id="9" presetID="45" presetClass="entr" presetSubtype="0" fill="hold" grpId="0" nodeType="clickEffect">
+                                  <p:stCondLst>
+                                    <p:cond delay="0"/>
+                                  </p:stCondLst>
+                                  <p:childTnLst>
+                                    <p:set>
+                                      <p:cBhvr>
+                                        <p:cTn id="10" dur="1" fill="hold">
+                                          <p:stCondLst>
+                                            <p:cond delay="0"/>
+                                          </p:stCondLst>
+                                        </p:cTn>
+                                        <p:tgtEl>
+                                          <p:spTgt spid="6"/>
+                                        </p:tgtEl>
+                                        <p:attrNameLst>
+                                          <p:attrName>style.visibility</p:attrName>
+                                        </p:attrNameLst>
+                                      </p:cBhvr>
+                                      <p:to>
+                                        <p:strVal val="visible"/>
+                                      </p:to>
+                                    </p:set>
+                                    <p:animEffect transition="in" filter="fade">
+                                      <p:cBhvr>
+                                        <p:cTn id="11" dur="2000"/>
+                                        <p:tgtEl>
+                                          <p:spTgt spid="6"/>
+                                        </p:tgtEl>
+                                      </p:cBhvr>
+                                    </p:animEffect>
+                                    <p:anim calcmode="lin" valueType="num">
+                                      <p:cBhvr>
+                                        <p:cTn id="12" dur="2000" fill="hold"/>
+                                        <p:tgtEl>
+                                          <p:spTgt spid="6"/>
+                                        </p:tgtEl>
+                                        <p:attrNameLst>
+                                          <p:attrName>ppt_w</p:attrName>
+                                        </p:attrNameLst>
+                                      </p:cBhvr>
+                                      <p:tavLst>
+                                        <p:tav tm="0" fmla="#ppt_w*sin(2.5*pi*$)">
+                                          <p:val>
+                                            <p:fltVal val="0"/>
+                                          </p:val>
+                                        </p:tav>
+                                        <p:tav tm="100000">
+                                          <p:val>
+                                            <p:fltVal val="1"/>
+                                          </p:val>
+                                        </p:tav>
+                                      </p:tavLst>
+                                    </p:anim>
+                                    <p:anim calcmode="lin" valueType="num">
+                                      <p:cBhvr>
+                                        <p:cTn id="13" dur="2000" fill="hold"/>
+                                        <p:tgtEl>
+                                          <p:spTgt spid="6"/>
+                                        </p:tgtEl>
+                                        <p:attrNameLst>
+                                          <p:attrName>ppt_h</p:attrName>
+                                        </p:attrNameLst>
+                                      </p:cBhvr>
+                                      <p:tavLst>
+                                        <p:tav tm="0">
+                                          <p:val>
+                                            <p:strVal val="#ppt_h"/>
+                                          </p:val>
+                                        </p:tav>
+                                        <p:tav tm="100000">
+                                          <p:val>
+                                            <p:strVal val="#ppt_h"/>
+                                          </p:val>
+                                        </p:tav>
+                                      </p:tavLst>
+                                    </p:anim>
+                                  </p:childTnLst>
+                                </p:cTn>
+                              </p:par>
+                            </p:childTnLst>
+                          </p:cTn>
+                        </p:par>
+                      </p:childTnLst>
+                    </p:cTn>
+                  </p:par>
+                  <p:par>
+                    <p:cTn id="14" fill="hold">
+                      <p:stCondLst>
+                        <p:cond delay="indefinite"/>
+                      </p:stCondLst>
+                      <p:childTnLst>
+                        <p:par>
+                          <p:cTn id="15" fill="hold">
+                            <p:stCondLst>
+                              <p:cond delay="0"/>
+                            </p:stCondLst>
+                            <p:childTnLst>
+                              <p:par>
+                                <p:cTn id="16" presetID="26" presetClass="entr" presetSubtype="0" fill="hold" grpId="0" nodeType="clickEffect">
+                                  <p:stCondLst>
+                                    <p:cond delay="0"/>
+                                  </p:stCondLst>
+                                  <p:childTnLst>
+                                    <p:set>
+                                      <p:cBhvr>
+                                        <p:cTn id="17" dur="1" fill="hold">
+                                          <p:stCondLst>
+                                            <p:cond delay="0"/>
+                                          </p:stCondLst>
+                                        </p:cTn>
+                                        <p:tgtEl>
+                                          <p:spTgt spid="5"/>
+                                        </p:tgtEl>
+                                        <p:attrNameLst>
+                                          <p:attrName>style.visibility</p:attrName>
+                                        </p:attrNameLst>
+                                      </p:cBhvr>
+                                      <p:to>
+                                        <p:strVal val="visible"/>
+                                      </p:to>
+                                    </p:set>
+                                    <p:animEffect transition="in" filter="wipe(down)">
+                                      <p:cBhvr>
+                                        <p:cTn id="18" dur="580">
+                                          <p:stCondLst>
+                                            <p:cond delay="0"/>
+                                          </p:stCondLst>
+                                        </p:cTn>
+                                        <p:tgtEl>
+                                          <p:spTgt spid="5"/>
+                                        </p:tgtEl>
+                                      </p:cBhvr>
+                                    </p:animEffect>
+                                    <p:anim calcmode="lin" valueType="num">
+                                      <p:cBhvr>
+                                        <p:cTn id="19" dur="1822" tmFilter="0,0; 0.14,0.36; 0.43,0.73; 0.71,0.91; 1.0,1.0">
+                                          <p:stCondLst>
+                                            <p:cond delay="0"/>
+                                          </p:stCondLst>
+                                        </p:cTn>
+                                        <p:tgtEl>
+                                          <p:spTgt spid="5"/>
+                                        </p:tgtEl>
+                                        <p:attrNameLst>
+                                          <p:attrName>ppt_x</p:attrName>
+                                        </p:attrNameLst>
+                                      </p:cBhvr>
+                                      <p:tavLst>
+                                        <p:tav tm="0">
+                                          <p:val>
+                                            <p:strVal val="#ppt_x-0.25"/>
+                                          </p:val>
+                                        </p:tav>
+                                        <p:tav tm="100000">
+                                          <p:val>
+                                            <p:strVal val="#ppt_x"/>
+                                          </p:val>
+                                        </p:tav>
+                                      </p:tavLst>
+                                    </p:anim>
+                                    <p:anim calcmode="lin" valueType="num">
+                                      <p:cBhvr>
+                                        <p:cTn id="20" dur="664" tmFilter="0.0,0.0; 0.25,0.07; 0.50,0.2; 0.75,0.467; 1.0,1.0">
+                                          <p:stCondLst>
+                                            <p:cond delay="0"/>
+                                          </p:stCondLst>
+                                        </p:cTn>
+                                        <p:tgtEl>
+                                          <p:spTgt spid="5"/>
+                                        </p:tgtEl>
+                                        <p:attrNameLst>
+                                          <p:attrName>ppt_y</p:attrName>
+                                        </p:attrNameLst>
+                                      </p:cBhvr>
+                                      <p:tavLst>
+                                        <p:tav tm="0" fmla="#ppt_y-sin(pi*$)/3">
+                                          <p:val>
+                                            <p:fltVal val="0.5"/>
+                                          </p:val>
+                                        </p:tav>
+                                        <p:tav tm="100000">
+                                          <p:val>
+                                            <p:fltVal val="1"/>
+                                          </p:val>
+                                        </p:tav>
+                                      </p:tavLst>
+                                    </p:anim>
+                                    <p:anim calcmode="lin" valueType="num">
+                                      <p:cBhvr>
+                                        <p:cTn id="21" dur="664" tmFilter="0, 0; 0.125,0.2665; 0.25,0.4; 0.375,0.465; 0.5,0.5;  0.625,0.535; 0.75,0.6; 0.875,0.7335; 1,1">
+                                          <p:stCondLst>
+                                            <p:cond delay="664"/>
+                                          </p:stCondLst>
+                                        </p:cTn>
+                                        <p:tgtEl>
+                                          <p:spTgt spid="5"/>
+                                        </p:tgtEl>
+                                        <p:attrNameLst>
+                                          <p:attrName>ppt_y</p:attrName>
+                                        </p:attrNameLst>
+                                      </p:cBhvr>
+                                      <p:tavLst>
+                                        <p:tav tm="0" fmla="#ppt_y-sin(pi*$)/9">
+                                          <p:val>
+                                            <p:fltVal val="0"/>
+                                          </p:val>
+                                        </p:tav>
+                                        <p:tav tm="100000">
+                                          <p:val>
+                                            <p:fltVal val="1"/>
+                                          </p:val>
+                                        </p:tav>
+                                      </p:tavLst>
+                                    </p:anim>
+                                    <p:anim calcmode="lin" valueType="num">
+                                      <p:cBhvr>
+                                        <p:cTn id="22" dur="332" tmFilter="0, 0; 0.125,0.2665; 0.25,0.4; 0.375,0.465; 0.5,0.5;  0.625,0.535; 0.75,0.6; 0.875,0.7335; 1,1">
+                                          <p:stCondLst>
+                                            <p:cond delay="1324"/>
+                                          </p:stCondLst>
+                                        </p:cTn>
+                                        <p:tgtEl>
+                                          <p:spTgt spid="5"/>
+                                        </p:tgtEl>
+                                        <p:attrNameLst>
+                                          <p:attrName>ppt_y</p:attrName>
+                                        </p:attrNameLst>
+                                      </p:cBhvr>
+                                      <p:tavLst>
+                                        <p:tav tm="0" fmla="#ppt_y-sin(pi*$)/27">
+                                          <p:val>
+                                            <p:fltVal val="0"/>
+                                          </p:val>
+                                        </p:tav>
+                                        <p:tav tm="100000">
+                                          <p:val>
+                                            <p:fltVal val="1"/>
+                                          </p:val>
+                                        </p:tav>
+                                      </p:tavLst>
+                                    </p:anim>
+                                    <p:anim calcmode="lin" valueType="num">
+                                      <p:cBhvr>
+                                        <p:cTn id="23" dur="164" tmFilter="0, 0; 0.125,0.2665; 0.25,0.4; 0.375,0.465; 0.5,0.5;  0.625,0.535; 0.75,0.6; 0.875,0.7335; 1,1">
+                                          <p:stCondLst>
+                                            <p:cond delay="1656"/>
+                                          </p:stCondLst>
+                                        </p:cTn>
+                                        <p:tgtEl>
+                                          <p:spTgt spid="5"/>
+                                        </p:tgtEl>
+                                        <p:attrNameLst>
+                                          <p:attrName>ppt_y</p:attrName>
+                                        </p:attrNameLst>
+                                      </p:cBhvr>
+                                      <p:tavLst>
+                                        <p:tav tm="0" fmla="#ppt_y-sin(pi*$)/81">
+                                          <p:val>
+                                            <p:fltVal val="0"/>
+                                          </p:val>
+                                        </p:tav>
+                                        <p:tav tm="100000">
+                                          <p:val>
+                                            <p:fltVal val="1"/>
+                                          </p:val>
+                                        </p:tav>
+                                      </p:tavLst>
+                                    </p:anim>
+                                    <p:animScale>
+                                      <p:cBhvr>
+                                        <p:cTn id="24" dur="26">
+                                          <p:stCondLst>
+                                            <p:cond delay="650"/>
+                                          </p:stCondLst>
+                                        </p:cTn>
+                                        <p:tgtEl>
+                                          <p:spTgt spid="5"/>
+                                        </p:tgtEl>
+                                      </p:cBhvr>
+                                      <p:to x="100000" y="60000"/>
+                                    </p:animScale>
+                                    <p:animScale>
+                                      <p:cBhvr>
+                                        <p:cTn id="25" dur="166" decel="50000">
+                                          <p:stCondLst>
+                                            <p:cond delay="676"/>
+                                          </p:stCondLst>
+                                        </p:cTn>
+                                        <p:tgtEl>
+                                          <p:spTgt spid="5"/>
+                                        </p:tgtEl>
+                                      </p:cBhvr>
+                                      <p:to x="100000" y="100000"/>
+                                    </p:animScale>
+                                    <p:animScale>
+                                      <p:cBhvr>
+                                        <p:cTn id="26" dur="26">
+                                          <p:stCondLst>
+                                            <p:cond delay="1312"/>
+                                          </p:stCondLst>
+                                        </p:cTn>
+                                        <p:tgtEl>
+                                          <p:spTgt spid="5"/>
+                                        </p:tgtEl>
+                                      </p:cBhvr>
+                                      <p:to x="100000" y="80000"/>
+                                    </p:animScale>
+                                    <p:animScale>
+                                      <p:cBhvr>
+                                        <p:cTn id="27" dur="166" decel="50000">
+                                          <p:stCondLst>
+                                            <p:cond delay="1338"/>
+                                          </p:stCondLst>
+                                        </p:cTn>
+                                        <p:tgtEl>
+                                          <p:spTgt spid="5"/>
+                                        </p:tgtEl>
+                                      </p:cBhvr>
+                                      <p:to x="100000" y="100000"/>
+                                    </p:animScale>
+                                    <p:animScale>
+                                      <p:cBhvr>
+                                        <p:cTn id="28" dur="26">
+                                          <p:stCondLst>
+                                            <p:cond delay="1642"/>
+                                          </p:stCondLst>
+                                        </p:cTn>
+                                        <p:tgtEl>
+                                          <p:spTgt spid="5"/>
+                                        </p:tgtEl>
+                                      </p:cBhvr>
+                                      <p:to x="100000" y="90000"/>
+                                    </p:animScale>
+                                    <p:animScale>
+                                      <p:cBhvr>
+                                        <p:cTn id="29" dur="166" decel="50000">
+                                          <p:stCondLst>
+                                            <p:cond delay="1668"/>
+                                          </p:stCondLst>
+                                        </p:cTn>
+                                        <p:tgtEl>
+                                          <p:spTgt spid="5"/>
+                                        </p:tgtEl>
+                                      </p:cBhvr>
+                                      <p:to x="100000" y="100000"/>
+                                    </p:animScale>
+                                    <p:animScale>
+                                      <p:cBhvr>
+                                        <p:cTn id="30" dur="26">
+                                          <p:stCondLst>
+                                            <p:cond delay="1808"/>
+                                          </p:stCondLst>
+                                        </p:cTn>
+                                        <p:tgtEl>
+                                          <p:spTgt spid="5"/>
+                                        </p:tgtEl>
+                                      </p:cBhvr>
+                                      <p:to x="100000" y="95000"/>
+                                    </p:animScale>
+                                    <p:animScale>
+                                      <p:cBhvr>
+                                        <p:cTn id="31" dur="166" decel="50000">
+                                          <p:stCondLst>
+                                            <p:cond delay="1834"/>
+                                          </p:stCondLst>
+                                        </p:cTn>
+                                        <p:tgtEl>
+                                          <p:spTgt spid="5"/>
+                                        </p:tgtEl>
+                                      </p:cBhvr>
+                                      <p:to x="100000" y="100000"/>
+                                    </p:animScale>
+                                  </p:childTnLst>
+                                </p:cTn>
+                              </p:par>
+                            </p:childTnLst>
+                          </p:cTn>
+                        </p:par>
+                      </p:childTnLst>
+                    </p:cTn>
+                  </p:par>
+                </p:childTnLst>
+              </p:cTn>
+              <p:prevCondLst>
+                <p:cond evt="onPrev" delay="0">
+                  <p:tgtEl>
+                    <p:sldTgt/>
+                  </p:tgtEl>
+                </p:cond>
+              </p:prevCondLst>
+              <p:nextCondLst>
+                <p:cond evt="onNext" delay="0">
+                  <p:tgtEl>
+                    <p:sldTgt/>
+                  </p:tgtEl>
+                </p:cond>
+              </p:nextCondLst>
+            </p:seq>
+          </p:childTnLst>
+        </p:cTn>
+      </p:par>
+    </p:tnLst>
+    <p:bldLst>
+      <p:bldP spid="2" grpId="0"/>
+      <p:bldP spid="5" grpId="0" animBg="1"/>
+      <p:bldP spid="6" grpId="0" animBg="1"/>
+    </p:bldLst>
+  </p:timing>
+</p:sld>
+</file>
+
+<file path=ppt/slides/slide6.xml><?xml version="1.0" encoding="utf-8"?>
+<p:sld xmlns:a="http://schemas.openxmlformats.org/drawingml/2006/main" xmlns:r="http://schemas.openxmlformats.org/officeDocument/2006/relationships" xmlns:p="http://schemas.openxmlformats.org/presentationml/2006/main">
+  <p:cSld>
+    <p:spTree>
+      <p:nvGrpSpPr>
+        <p:cNvPr id="1" name=""/>
+        <p:cNvGrpSpPr/>
+        <p:nvPr/>
+      </p:nvGrpSpPr>
+      <p:grpSpPr>
+        <a:xfrm>
+          <a:off x="0" y="0"/>
+          <a:ext cx="0" cy="0"/>
+          <a:chOff x="0" y="0"/>
+          <a:chExt cx="0" cy="0"/>
+        </a:xfrm>
+      </p:grpSpPr>
+      <p:sp>
+        <p:nvSpPr>
+          <p:cNvPr id="2" name="Title 1"/>
+          <p:cNvSpPr>
+            <a:spLocks noGrp="1"/>
+          </p:cNvSpPr>
+          <p:nvPr>
+            <p:ph type="title"/>
           </p:nvPr>
         </p:nvSpPr>
         <p:spPr>
           <a:xfrm>
-            <a:off x="1907391" y="2148384"/>
-            <a:ext cx="10018713" cy="3124201"/>
+            <a:off x="1484310" y="276645"/>
+            <a:ext cx="10018713" cy="1151420"/>
           </a:xfrm>
         </p:spPr>
         <p:txBody>
           <a:bodyPr/>
           <a:lstStyle/>
           <a:p>
+            <a:r>
+              <a:rPr lang="fr-FR" dirty="0" smtClean="0"/>
+              <a:t> </a:t>
+            </a:r>
+            <a:r>
+              <a:rPr lang="fr-FR" b="1" dirty="0">
+                <a:solidFill>
+                  <a:schemeClr val="accent5">
+                    <a:lumMod val="50000"/>
+                  </a:schemeClr>
+                </a:solidFill>
+                <a:latin typeface="Calibri" panose="020F0502020204030204" pitchFamily="34" charset="0"/>
+              </a:rPr>
+              <a:t>Récapitulation</a:t>
+            </a:r>
+          </a:p>
+        </p:txBody>
+      </p:sp>
+      <p:sp>
+        <p:nvSpPr>
+          <p:cNvPr id="8" name="Content Placeholder 7"/>
+          <p:cNvSpPr>
+            <a:spLocks noGrp="1"/>
+          </p:cNvSpPr>
+          <p:nvPr>
+            <p:ph idx="1"/>
+          </p:nvPr>
+        </p:nvSpPr>
+        <p:spPr/>
+        <p:txBody>
+          <a:bodyPr/>
+          <a:lstStyle/>
+          <a:p>
             <a:pPr marL="0" indent="0">
               <a:buNone/>
             </a:pPr>
             <a:r>
-              <a:rPr lang="fr-FR" sz="2000" dirty="0" smtClean="0"/>
+              <a:rPr lang="fr-FR" dirty="0"/>
+              <a:t> </a:t>
+            </a:r>
+          </a:p>
+        </p:txBody>
+      </p:sp>
+      <p:pic>
+        <p:nvPicPr>
+          <p:cNvPr id="9" name="Picture 8"/>
+          <p:cNvPicPr>
+            <a:picLocks noChangeAspect="1"/>
+          </p:cNvPicPr>
+          <p:nvPr/>
+        </p:nvPicPr>
+        <p:blipFill>
+          <a:blip r:embed="rId2">
+            <a:extLst>
+              <a:ext uri="{28A0092B-C50C-407E-A947-70E740481C1C}">
+                <a14:useLocalDpi xmlns:a14="http://schemas.microsoft.com/office/drawing/2010/main" val="0"/>
+              </a:ext>
+            </a:extLst>
+          </a:blip>
+          <a:stretch>
+            <a:fillRect/>
+          </a:stretch>
+        </p:blipFill>
+        <p:spPr>
+          <a:xfrm>
+            <a:off x="2853251" y="2216085"/>
+            <a:ext cx="8964874" cy="4482437"/>
+          </a:xfrm>
+          <a:prstGeom prst="rect">
+            <a:avLst/>
+          </a:prstGeom>
+        </p:spPr>
+      </p:pic>
+      <p:pic>
+        <p:nvPicPr>
+          <p:cNvPr id="10" name="Picture 9"/>
+          <p:cNvPicPr>
+            <a:picLocks noChangeAspect="1"/>
+          </p:cNvPicPr>
+          <p:nvPr/>
+        </p:nvPicPr>
+        <p:blipFill>
+          <a:blip r:embed="rId3">
+            <a:extLst>
+              <a:ext uri="{28A0092B-C50C-407E-A947-70E740481C1C}">
+                <a14:useLocalDpi xmlns:a14="http://schemas.microsoft.com/office/drawing/2010/main" val="0"/>
+              </a:ext>
+            </a:extLst>
+          </a:blip>
+          <a:stretch>
+            <a:fillRect/>
+          </a:stretch>
+        </p:blipFill>
+        <p:spPr>
+          <a:xfrm rot="20092029">
+            <a:off x="3142122" y="2662413"/>
+            <a:ext cx="3448079" cy="2128907"/>
+          </a:xfrm>
+          <a:prstGeom prst="rect">
+            <a:avLst/>
+          </a:prstGeom>
+        </p:spPr>
+      </p:pic>
+      <p:pic>
+        <p:nvPicPr>
+          <p:cNvPr id="11" name="Picture 10"/>
+          <p:cNvPicPr>
+            <a:picLocks noChangeAspect="1"/>
+          </p:cNvPicPr>
+          <p:nvPr/>
+        </p:nvPicPr>
+        <p:blipFill>
+          <a:blip r:embed="rId4">
+            <a:extLst>
+              <a:ext uri="{28A0092B-C50C-407E-A947-70E740481C1C}">
+                <a14:useLocalDpi xmlns:a14="http://schemas.microsoft.com/office/drawing/2010/main" val="0"/>
+              </a:ext>
+            </a:extLst>
+          </a:blip>
+          <a:stretch>
+            <a:fillRect/>
+          </a:stretch>
+        </p:blipFill>
+        <p:spPr>
+          <a:xfrm rot="1254761">
+            <a:off x="8290864" y="2290890"/>
+            <a:ext cx="3421743" cy="2412900"/>
+          </a:xfrm>
+          <a:prstGeom prst="rect">
+            <a:avLst/>
+          </a:prstGeom>
+        </p:spPr>
+      </p:pic>
+      <p:pic>
+        <p:nvPicPr>
+          <p:cNvPr id="12" name="Picture 11"/>
+          <p:cNvPicPr>
+            <a:picLocks noChangeAspect="1"/>
+          </p:cNvPicPr>
+          <p:nvPr/>
+        </p:nvPicPr>
+        <p:blipFill>
+          <a:blip r:embed="rId5">
+            <a:extLst>
+              <a:ext uri="{28A0092B-C50C-407E-A947-70E740481C1C}">
+                <a14:useLocalDpi xmlns:a14="http://schemas.microsoft.com/office/drawing/2010/main" val="0"/>
+              </a:ext>
+            </a:extLst>
+          </a:blip>
+          <a:stretch>
+            <a:fillRect/>
+          </a:stretch>
+        </p:blipFill>
+        <p:spPr>
+          <a:xfrm rot="20901364">
+            <a:off x="5557895" y="5021877"/>
+            <a:ext cx="3905795" cy="1352739"/>
+          </a:xfrm>
+          <a:prstGeom prst="rect">
+            <a:avLst/>
+          </a:prstGeom>
+        </p:spPr>
+      </p:pic>
+    </p:spTree>
+    <p:extLst>
+      <p:ext uri="{BB962C8B-B14F-4D97-AF65-F5344CB8AC3E}">
+        <p14:creationId xmlns:p14="http://schemas.microsoft.com/office/powerpoint/2010/main" val="4214353612"/>
+      </p:ext>
+    </p:extLst>
+  </p:cSld>
+  <p:clrMapOvr>
+    <a:masterClrMapping/>
+  </p:clrMapOvr>
+  <p:timing>
+    <p:tnLst>
+      <p:par>
+        <p:cTn id="1" dur="indefinite" restart="never" nodeType="tmRoot">
+          <p:childTnLst>
+            <p:seq concurrent="1" nextAc="seek">
+              <p:cTn id="2" dur="indefinite" nodeType="mainSeq">
+                <p:childTnLst>
+                  <p:par>
+                    <p:cTn id="3" fill="hold">
+                      <p:stCondLst>
+                        <p:cond delay="indefinite"/>
+                      </p:stCondLst>
+                      <p:childTnLst>
+                        <p:par>
+                          <p:cTn id="4" fill="hold">
+                            <p:stCondLst>
+                              <p:cond delay="0"/>
+                            </p:stCondLst>
+                            <p:childTnLst>
+                              <p:par>
+                                <p:cTn id="5" presetID="31" presetClass="entr" presetSubtype="0" fill="hold" grpId="0" nodeType="clickEffect">
+                                  <p:stCondLst>
+                                    <p:cond delay="0"/>
+                                  </p:stCondLst>
+                                  <p:childTnLst>
+                                    <p:set>
+                                      <p:cBhvr>
+                                        <p:cTn id="6" dur="1" fill="hold">
+                                          <p:stCondLst>
+                                            <p:cond delay="0"/>
+                                          </p:stCondLst>
+                                        </p:cTn>
+                                        <p:tgtEl>
+                                          <p:spTgt spid="2"/>
+                                        </p:tgtEl>
+                                        <p:attrNameLst>
+                                          <p:attrName>style.visibility</p:attrName>
+                                        </p:attrNameLst>
+                                      </p:cBhvr>
+                                      <p:to>
+                                        <p:strVal val="visible"/>
+                                      </p:to>
+                                    </p:set>
+                                    <p:anim calcmode="lin" valueType="num">
+                                      <p:cBhvr>
+                                        <p:cTn id="7" dur="1000" fill="hold"/>
+                                        <p:tgtEl>
+                                          <p:spTgt spid="2"/>
+                                        </p:tgtEl>
+                                        <p:attrNameLst>
+                                          <p:attrName>ppt_w</p:attrName>
+                                        </p:attrNameLst>
+                                      </p:cBhvr>
+                                      <p:tavLst>
+                                        <p:tav tm="0">
+                                          <p:val>
+                                            <p:fltVal val="0"/>
+                                          </p:val>
+                                        </p:tav>
+                                        <p:tav tm="100000">
+                                          <p:val>
+                                            <p:strVal val="#ppt_w"/>
+                                          </p:val>
+                                        </p:tav>
+                                      </p:tavLst>
+                                    </p:anim>
+                                    <p:anim calcmode="lin" valueType="num">
+                                      <p:cBhvr>
+                                        <p:cTn id="8" dur="1000" fill="hold"/>
+                                        <p:tgtEl>
+                                          <p:spTgt spid="2"/>
+                                        </p:tgtEl>
+                                        <p:attrNameLst>
+                                          <p:attrName>ppt_h</p:attrName>
+                                        </p:attrNameLst>
+                                      </p:cBhvr>
+                                      <p:tavLst>
+                                        <p:tav tm="0">
+                                          <p:val>
+                                            <p:fltVal val="0"/>
+                                          </p:val>
+                                        </p:tav>
+                                        <p:tav tm="100000">
+                                          <p:val>
+                                            <p:strVal val="#ppt_h"/>
+                                          </p:val>
+                                        </p:tav>
+                                      </p:tavLst>
+                                    </p:anim>
+                                    <p:anim calcmode="lin" valueType="num">
+                                      <p:cBhvr>
+                                        <p:cTn id="9" dur="1000" fill="hold"/>
+                                        <p:tgtEl>
+                                          <p:spTgt spid="2"/>
+                                        </p:tgtEl>
+                                        <p:attrNameLst>
+                                          <p:attrName>style.rotation</p:attrName>
+                                        </p:attrNameLst>
+                                      </p:cBhvr>
+                                      <p:tavLst>
+                                        <p:tav tm="0">
+                                          <p:val>
+                                            <p:fltVal val="90"/>
+                                          </p:val>
+                                        </p:tav>
+                                        <p:tav tm="100000">
+                                          <p:val>
+                                            <p:fltVal val="0"/>
+                                          </p:val>
+                                        </p:tav>
+                                      </p:tavLst>
+                                    </p:anim>
+                                    <p:animEffect transition="in" filter="fade">
+                                      <p:cBhvr>
+                                        <p:cTn id="10" dur="1000"/>
+                                        <p:tgtEl>
+                                          <p:spTgt spid="2"/>
+                                        </p:tgtEl>
+                                      </p:cBhvr>
+                                    </p:animEffect>
+                                  </p:childTnLst>
+                                </p:cTn>
+                              </p:par>
+                            </p:childTnLst>
+                          </p:cTn>
+                        </p:par>
+                      </p:childTnLst>
+                    </p:cTn>
+                  </p:par>
+                  <p:par>
+                    <p:cTn id="11" fill="hold">
+                      <p:stCondLst>
+                        <p:cond delay="indefinite"/>
+                      </p:stCondLst>
+                      <p:childTnLst>
+                        <p:par>
+                          <p:cTn id="12" fill="hold">
+                            <p:stCondLst>
+                              <p:cond delay="0"/>
+                            </p:stCondLst>
+                            <p:childTnLst>
+                              <p:par>
+                                <p:cTn id="13" presetID="2" presetClass="entr" presetSubtype="4" fill="hold" nodeType="clickEffect">
+                                  <p:stCondLst>
+                                    <p:cond delay="0"/>
+                                  </p:stCondLst>
+                                  <p:childTnLst>
+                                    <p:set>
+                                      <p:cBhvr>
+                                        <p:cTn id="14" dur="1" fill="hold">
+                                          <p:stCondLst>
+                                            <p:cond delay="0"/>
+                                          </p:stCondLst>
+                                        </p:cTn>
+                                        <p:tgtEl>
+                                          <p:spTgt spid="9"/>
+                                        </p:tgtEl>
+                                        <p:attrNameLst>
+                                          <p:attrName>style.visibility</p:attrName>
+                                        </p:attrNameLst>
+                                      </p:cBhvr>
+                                      <p:to>
+                                        <p:strVal val="visible"/>
+                                      </p:to>
+                                    </p:set>
+                                    <p:anim calcmode="lin" valueType="num">
+                                      <p:cBhvr additive="base">
+                                        <p:cTn id="15" dur="500" fill="hold"/>
+                                        <p:tgtEl>
+                                          <p:spTgt spid="9"/>
+                                        </p:tgtEl>
+                                        <p:attrNameLst>
+                                          <p:attrName>ppt_x</p:attrName>
+                                        </p:attrNameLst>
+                                      </p:cBhvr>
+                                      <p:tavLst>
+                                        <p:tav tm="0">
+                                          <p:val>
+                                            <p:strVal val="#ppt_x"/>
+                                          </p:val>
+                                        </p:tav>
+                                        <p:tav tm="100000">
+                                          <p:val>
+                                            <p:strVal val="#ppt_x"/>
+                                          </p:val>
+                                        </p:tav>
+                                      </p:tavLst>
+                                    </p:anim>
+                                    <p:anim calcmode="lin" valueType="num">
+                                      <p:cBhvr additive="base">
+                                        <p:cTn id="16" dur="500" fill="hold"/>
+                                        <p:tgtEl>
+                                          <p:spTgt spid="9"/>
+                                        </p:tgtEl>
+                                        <p:attrNameLst>
+                                          <p:attrName>ppt_y</p:attrName>
+                                        </p:attrNameLst>
+                                      </p:cBhvr>
+                                      <p:tavLst>
+                                        <p:tav tm="0">
+                                          <p:val>
+                                            <p:strVal val="1+#ppt_h/2"/>
+                                          </p:val>
+                                        </p:tav>
+                                        <p:tav tm="100000">
+                                          <p:val>
+                                            <p:strVal val="#ppt_y"/>
+                                          </p:val>
+                                        </p:tav>
+                                      </p:tavLst>
+                                    </p:anim>
+                                  </p:childTnLst>
+                                </p:cTn>
+                              </p:par>
+                            </p:childTnLst>
+                          </p:cTn>
+                        </p:par>
+                      </p:childTnLst>
+                    </p:cTn>
+                  </p:par>
+                  <p:par>
+                    <p:cTn id="17" fill="hold">
+                      <p:stCondLst>
+                        <p:cond delay="indefinite"/>
+                      </p:stCondLst>
+                      <p:childTnLst>
+                        <p:par>
+                          <p:cTn id="18" fill="hold">
+                            <p:stCondLst>
+                              <p:cond delay="0"/>
+                            </p:stCondLst>
+                            <p:childTnLst>
+                              <p:par>
+                                <p:cTn id="19" presetID="6" presetClass="entr" presetSubtype="16" fill="hold" nodeType="clickEffect">
+                                  <p:stCondLst>
+                                    <p:cond delay="0"/>
+                                  </p:stCondLst>
+                                  <p:childTnLst>
+                                    <p:set>
+                                      <p:cBhvr>
+                                        <p:cTn id="20" dur="1" fill="hold">
+                                          <p:stCondLst>
+                                            <p:cond delay="0"/>
+                                          </p:stCondLst>
+                                        </p:cTn>
+                                        <p:tgtEl>
+                                          <p:spTgt spid="10"/>
+                                        </p:tgtEl>
+                                        <p:attrNameLst>
+                                          <p:attrName>style.visibility</p:attrName>
+                                        </p:attrNameLst>
+                                      </p:cBhvr>
+                                      <p:to>
+                                        <p:strVal val="visible"/>
+                                      </p:to>
+                                    </p:set>
+                                    <p:animEffect transition="in" filter="circle(in)">
+                                      <p:cBhvr>
+                                        <p:cTn id="21" dur="2000"/>
+                                        <p:tgtEl>
+                                          <p:spTgt spid="10"/>
+                                        </p:tgtEl>
+                                      </p:cBhvr>
+                                    </p:animEffect>
+                                  </p:childTnLst>
+                                </p:cTn>
+                              </p:par>
+                            </p:childTnLst>
+                          </p:cTn>
+                        </p:par>
+                      </p:childTnLst>
+                    </p:cTn>
+                  </p:par>
+                  <p:par>
+                    <p:cTn id="22" fill="hold">
+                      <p:stCondLst>
+                        <p:cond delay="indefinite"/>
+                      </p:stCondLst>
+                      <p:childTnLst>
+                        <p:par>
+                          <p:cTn id="23" fill="hold">
+                            <p:stCondLst>
+                              <p:cond delay="0"/>
+                            </p:stCondLst>
+                            <p:childTnLst>
+                              <p:par>
+                                <p:cTn id="24" presetID="45" presetClass="entr" presetSubtype="0" fill="hold" nodeType="clickEffect">
+                                  <p:stCondLst>
+                                    <p:cond delay="0"/>
+                                  </p:stCondLst>
+                                  <p:childTnLst>
+                                    <p:set>
+                                      <p:cBhvr>
+                                        <p:cTn id="25" dur="1" fill="hold">
+                                          <p:stCondLst>
+                                            <p:cond delay="0"/>
+                                          </p:stCondLst>
+                                        </p:cTn>
+                                        <p:tgtEl>
+                                          <p:spTgt spid="11"/>
+                                        </p:tgtEl>
+                                        <p:attrNameLst>
+                                          <p:attrName>style.visibility</p:attrName>
+                                        </p:attrNameLst>
+                                      </p:cBhvr>
+                                      <p:to>
+                                        <p:strVal val="visible"/>
+                                      </p:to>
+                                    </p:set>
+                                    <p:animEffect transition="in" filter="fade">
+                                      <p:cBhvr>
+                                        <p:cTn id="26" dur="2000"/>
+                                        <p:tgtEl>
+                                          <p:spTgt spid="11"/>
+                                        </p:tgtEl>
+                                      </p:cBhvr>
+                                    </p:animEffect>
+                                    <p:anim calcmode="lin" valueType="num">
+                                      <p:cBhvr>
+                                        <p:cTn id="27" dur="2000" fill="hold"/>
+                                        <p:tgtEl>
+                                          <p:spTgt spid="11"/>
+                                        </p:tgtEl>
+                                        <p:attrNameLst>
+                                          <p:attrName>ppt_w</p:attrName>
+                                        </p:attrNameLst>
+                                      </p:cBhvr>
+                                      <p:tavLst>
+                                        <p:tav tm="0" fmla="#ppt_w*sin(2.5*pi*$)">
+                                          <p:val>
+                                            <p:fltVal val="0"/>
+                                          </p:val>
+                                        </p:tav>
+                                        <p:tav tm="100000">
+                                          <p:val>
+                                            <p:fltVal val="1"/>
+                                          </p:val>
+                                        </p:tav>
+                                      </p:tavLst>
+                                    </p:anim>
+                                    <p:anim calcmode="lin" valueType="num">
+                                      <p:cBhvr>
+                                        <p:cTn id="28" dur="2000" fill="hold"/>
+                                        <p:tgtEl>
+                                          <p:spTgt spid="11"/>
+                                        </p:tgtEl>
+                                        <p:attrNameLst>
+                                          <p:attrName>ppt_h</p:attrName>
+                                        </p:attrNameLst>
+                                      </p:cBhvr>
+                                      <p:tavLst>
+                                        <p:tav tm="0">
+                                          <p:val>
+                                            <p:strVal val="#ppt_h"/>
+                                          </p:val>
+                                        </p:tav>
+                                        <p:tav tm="100000">
+                                          <p:val>
+                                            <p:strVal val="#ppt_h"/>
+                                          </p:val>
+                                        </p:tav>
+                                      </p:tavLst>
+                                    </p:anim>
+                                  </p:childTnLst>
+                                </p:cTn>
+                              </p:par>
+                            </p:childTnLst>
+                          </p:cTn>
+                        </p:par>
+                      </p:childTnLst>
+                    </p:cTn>
+                  </p:par>
+                  <p:par>
+                    <p:cTn id="29" fill="hold">
+                      <p:stCondLst>
+                        <p:cond delay="indefinite"/>
+                      </p:stCondLst>
+                      <p:childTnLst>
+                        <p:par>
+                          <p:cTn id="30" fill="hold">
+                            <p:stCondLst>
+                              <p:cond delay="0"/>
+                            </p:stCondLst>
+                            <p:childTnLst>
+                              <p:par>
+                                <p:cTn id="31" presetID="26" presetClass="entr" presetSubtype="0" fill="hold" nodeType="clickEffect">
+                                  <p:stCondLst>
+                                    <p:cond delay="0"/>
+                                  </p:stCondLst>
+                                  <p:childTnLst>
+                                    <p:set>
+                                      <p:cBhvr>
+                                        <p:cTn id="32" dur="1" fill="hold">
+                                          <p:stCondLst>
+                                            <p:cond delay="0"/>
+                                          </p:stCondLst>
+                                        </p:cTn>
+                                        <p:tgtEl>
+                                          <p:spTgt spid="12"/>
+                                        </p:tgtEl>
+                                        <p:attrNameLst>
+                                          <p:attrName>style.visibility</p:attrName>
+                                        </p:attrNameLst>
+                                      </p:cBhvr>
+                                      <p:to>
+                                        <p:strVal val="visible"/>
+                                      </p:to>
+                                    </p:set>
+                                    <p:animEffect transition="in" filter="wipe(down)">
+                                      <p:cBhvr>
+                                        <p:cTn id="33" dur="580">
+                                          <p:stCondLst>
+                                            <p:cond delay="0"/>
+                                          </p:stCondLst>
+                                        </p:cTn>
+                                        <p:tgtEl>
+                                          <p:spTgt spid="12"/>
+                                        </p:tgtEl>
+                                      </p:cBhvr>
+                                    </p:animEffect>
+                                    <p:anim calcmode="lin" valueType="num">
+                                      <p:cBhvr>
+                                        <p:cTn id="34" dur="1822" tmFilter="0,0; 0.14,0.36; 0.43,0.73; 0.71,0.91; 1.0,1.0">
+                                          <p:stCondLst>
+                                            <p:cond delay="0"/>
+                                          </p:stCondLst>
+                                        </p:cTn>
+                                        <p:tgtEl>
+                                          <p:spTgt spid="12"/>
+                                        </p:tgtEl>
+                                        <p:attrNameLst>
+                                          <p:attrName>ppt_x</p:attrName>
+                                        </p:attrNameLst>
+                                      </p:cBhvr>
+                                      <p:tavLst>
+                                        <p:tav tm="0">
+                                          <p:val>
+                                            <p:strVal val="#ppt_x-0.25"/>
+                                          </p:val>
+                                        </p:tav>
+                                        <p:tav tm="100000">
+                                          <p:val>
+                                            <p:strVal val="#ppt_x"/>
+                                          </p:val>
+                                        </p:tav>
+                                      </p:tavLst>
+                                    </p:anim>
+                                    <p:anim calcmode="lin" valueType="num">
+                                      <p:cBhvr>
+                                        <p:cTn id="35" dur="664" tmFilter="0.0,0.0; 0.25,0.07; 0.50,0.2; 0.75,0.467; 1.0,1.0">
+                                          <p:stCondLst>
+                                            <p:cond delay="0"/>
+                                          </p:stCondLst>
+                                        </p:cTn>
+                                        <p:tgtEl>
+                                          <p:spTgt spid="12"/>
+                                        </p:tgtEl>
+                                        <p:attrNameLst>
+                                          <p:attrName>ppt_y</p:attrName>
+                                        </p:attrNameLst>
+                                      </p:cBhvr>
+                                      <p:tavLst>
+                                        <p:tav tm="0" fmla="#ppt_y-sin(pi*$)/3">
+                                          <p:val>
+                                            <p:fltVal val="0.5"/>
+                                          </p:val>
+                                        </p:tav>
+                                        <p:tav tm="100000">
+                                          <p:val>
+                                            <p:fltVal val="1"/>
+                                          </p:val>
+                                        </p:tav>
+                                      </p:tavLst>
+                                    </p:anim>
+                                    <p:anim calcmode="lin" valueType="num">
+                                      <p:cBhvr>
+                                        <p:cTn id="36" dur="664" tmFilter="0, 0; 0.125,0.2665; 0.25,0.4; 0.375,0.465; 0.5,0.5;  0.625,0.535; 0.75,0.6; 0.875,0.7335; 1,1">
+                                          <p:stCondLst>
+                                            <p:cond delay="664"/>
+                                          </p:stCondLst>
+                                        </p:cTn>
+                                        <p:tgtEl>
+                                          <p:spTgt spid="12"/>
+                                        </p:tgtEl>
+                                        <p:attrNameLst>
+                                          <p:attrName>ppt_y</p:attrName>
+                                        </p:attrNameLst>
+                                      </p:cBhvr>
+                                      <p:tavLst>
+                                        <p:tav tm="0" fmla="#ppt_y-sin(pi*$)/9">
+                                          <p:val>
+                                            <p:fltVal val="0"/>
+                                          </p:val>
+                                        </p:tav>
+                                        <p:tav tm="100000">
+                                          <p:val>
+                                            <p:fltVal val="1"/>
+                                          </p:val>
+                                        </p:tav>
+                                      </p:tavLst>
+                                    </p:anim>
+                                    <p:anim calcmode="lin" valueType="num">
+                                      <p:cBhvr>
+                                        <p:cTn id="37" dur="332" tmFilter="0, 0; 0.125,0.2665; 0.25,0.4; 0.375,0.465; 0.5,0.5;  0.625,0.535; 0.75,0.6; 0.875,0.7335; 1,1">
+                                          <p:stCondLst>
+                                            <p:cond delay="1324"/>
+                                          </p:stCondLst>
+                                        </p:cTn>
+                                        <p:tgtEl>
+                                          <p:spTgt spid="12"/>
+                                        </p:tgtEl>
+                                        <p:attrNameLst>
+                                          <p:attrName>ppt_y</p:attrName>
+                                        </p:attrNameLst>
+                                      </p:cBhvr>
+                                      <p:tavLst>
+                                        <p:tav tm="0" fmla="#ppt_y-sin(pi*$)/27">
+                                          <p:val>
+                                            <p:fltVal val="0"/>
+                                          </p:val>
+                                        </p:tav>
+                                        <p:tav tm="100000">
+                                          <p:val>
+                                            <p:fltVal val="1"/>
+                                          </p:val>
+                                        </p:tav>
+                                      </p:tavLst>
+                                    </p:anim>
+                                    <p:anim calcmode="lin" valueType="num">
+                                      <p:cBhvr>
+                                        <p:cTn id="38" dur="164" tmFilter="0, 0; 0.125,0.2665; 0.25,0.4; 0.375,0.465; 0.5,0.5;  0.625,0.535; 0.75,0.6; 0.875,0.7335; 1,1">
+                                          <p:stCondLst>
+                                            <p:cond delay="1656"/>
+                                          </p:stCondLst>
+                                        </p:cTn>
+                                        <p:tgtEl>
+                                          <p:spTgt spid="12"/>
+                                        </p:tgtEl>
+                                        <p:attrNameLst>
+                                          <p:attrName>ppt_y</p:attrName>
+                                        </p:attrNameLst>
+                                      </p:cBhvr>
+                                      <p:tavLst>
+                                        <p:tav tm="0" fmla="#ppt_y-sin(pi*$)/81">
+                                          <p:val>
+                                            <p:fltVal val="0"/>
+                                          </p:val>
+                                        </p:tav>
+                                        <p:tav tm="100000">
+                                          <p:val>
+                                            <p:fltVal val="1"/>
+                                          </p:val>
+                                        </p:tav>
+                                      </p:tavLst>
+                                    </p:anim>
+                                    <p:animScale>
+                                      <p:cBhvr>
+                                        <p:cTn id="39" dur="26">
+                                          <p:stCondLst>
+                                            <p:cond delay="650"/>
+                                          </p:stCondLst>
+                                        </p:cTn>
+                                        <p:tgtEl>
+                                          <p:spTgt spid="12"/>
+                                        </p:tgtEl>
+                                      </p:cBhvr>
+                                      <p:to x="100000" y="60000"/>
+                                    </p:animScale>
+                                    <p:animScale>
+                                      <p:cBhvr>
+                                        <p:cTn id="40" dur="166" decel="50000">
+                                          <p:stCondLst>
+                                            <p:cond delay="676"/>
+                                          </p:stCondLst>
+                                        </p:cTn>
+                                        <p:tgtEl>
+                                          <p:spTgt spid="12"/>
+                                        </p:tgtEl>
+                                      </p:cBhvr>
+                                      <p:to x="100000" y="100000"/>
+                                    </p:animScale>
+                                    <p:animScale>
+                                      <p:cBhvr>
+                                        <p:cTn id="41" dur="26">
+                                          <p:stCondLst>
+                                            <p:cond delay="1312"/>
+                                          </p:stCondLst>
+                                        </p:cTn>
+                                        <p:tgtEl>
+                                          <p:spTgt spid="12"/>
+                                        </p:tgtEl>
+                                      </p:cBhvr>
+                                      <p:to x="100000" y="80000"/>
+                                    </p:animScale>
+                                    <p:animScale>
+                                      <p:cBhvr>
+                                        <p:cTn id="42" dur="166" decel="50000">
+                                          <p:stCondLst>
+                                            <p:cond delay="1338"/>
+                                          </p:stCondLst>
+                                        </p:cTn>
+                                        <p:tgtEl>
+                                          <p:spTgt spid="12"/>
+                                        </p:tgtEl>
+                                      </p:cBhvr>
+                                      <p:to x="100000" y="100000"/>
+                                    </p:animScale>
+                                    <p:animScale>
+                                      <p:cBhvr>
+                                        <p:cTn id="43" dur="26">
+                                          <p:stCondLst>
+                                            <p:cond delay="1642"/>
+                                          </p:stCondLst>
+                                        </p:cTn>
+                                        <p:tgtEl>
+                                          <p:spTgt spid="12"/>
+                                        </p:tgtEl>
+                                      </p:cBhvr>
+                                      <p:to x="100000" y="90000"/>
+                                    </p:animScale>
+                                    <p:animScale>
+                                      <p:cBhvr>
+                                        <p:cTn id="44" dur="166" decel="50000">
+                                          <p:stCondLst>
+                                            <p:cond delay="1668"/>
+                                          </p:stCondLst>
+                                        </p:cTn>
+                                        <p:tgtEl>
+                                          <p:spTgt spid="12"/>
+                                        </p:tgtEl>
+                                      </p:cBhvr>
+                                      <p:to x="100000" y="100000"/>
+                                    </p:animScale>
+                                    <p:animScale>
+                                      <p:cBhvr>
+                                        <p:cTn id="45" dur="26">
+                                          <p:stCondLst>
+                                            <p:cond delay="1808"/>
+                                          </p:stCondLst>
+                                        </p:cTn>
+                                        <p:tgtEl>
+                                          <p:spTgt spid="12"/>
+                                        </p:tgtEl>
+                                      </p:cBhvr>
+                                      <p:to x="100000" y="95000"/>
+                                    </p:animScale>
+                                    <p:animScale>
+                                      <p:cBhvr>
+                                        <p:cTn id="46" dur="166" decel="50000">
+                                          <p:stCondLst>
+                                            <p:cond delay="1834"/>
+                                          </p:stCondLst>
+                                        </p:cTn>
+                                        <p:tgtEl>
+                                          <p:spTgt spid="12"/>
+                                        </p:tgtEl>
+                                      </p:cBhvr>
+                                      <p:to x="100000" y="100000"/>
+                                    </p:animScale>
+                                  </p:childTnLst>
+                                </p:cTn>
+                              </p:par>
+                            </p:childTnLst>
+                          </p:cTn>
+                        </p:par>
+                      </p:childTnLst>
+                    </p:cTn>
+                  </p:par>
+                </p:childTnLst>
+              </p:cTn>
+              <p:prevCondLst>
+                <p:cond evt="onPrev" delay="0">
+                  <p:tgtEl>
+                    <p:sldTgt/>
+                  </p:tgtEl>
+                </p:cond>
+              </p:prevCondLst>
+              <p:nextCondLst>
+                <p:cond evt="onNext" delay="0">
+                  <p:tgtEl>
+                    <p:sldTgt/>
+                  </p:tgtEl>
+                </p:cond>
+              </p:nextCondLst>
+            </p:seq>
+          </p:childTnLst>
+        </p:cTn>
+      </p:par>
+    </p:tnLst>
+    <p:bldLst>
+      <p:bldP spid="2" grpId="0"/>
+    </p:bldLst>
+  </p:timing>
+</p:sld>
+</file>
+
+<file path=ppt/slides/slide7.xml><?xml version="1.0" encoding="utf-8"?>
+<p:sld xmlns:a="http://schemas.openxmlformats.org/drawingml/2006/main" xmlns:r="http://schemas.openxmlformats.org/officeDocument/2006/relationships" xmlns:p="http://schemas.openxmlformats.org/presentationml/2006/main">
+  <p:cSld>
+    <p:spTree>
+      <p:nvGrpSpPr>
+        <p:cNvPr id="1" name=""/>
+        <p:cNvGrpSpPr/>
+        <p:nvPr/>
+      </p:nvGrpSpPr>
+      <p:grpSpPr>
+        <a:xfrm>
+          <a:off x="0" y="0"/>
+          <a:ext cx="0" cy="0"/>
+          <a:chOff x="0" y="0"/>
+          <a:chExt cx="0" cy="0"/>
+        </a:xfrm>
+      </p:grpSpPr>
+      <p:sp>
+        <p:nvSpPr>
+          <p:cNvPr id="2" name="Title 1"/>
+          <p:cNvSpPr>
+            <a:spLocks noGrp="1"/>
+          </p:cNvSpPr>
+          <p:nvPr>
+            <p:ph type="title"/>
+          </p:nvPr>
+        </p:nvSpPr>
+        <p:spPr>
+          <a:xfrm>
+            <a:off x="1429720" y="2814851"/>
+            <a:ext cx="10018713" cy="1752599"/>
+          </a:xfrm>
+        </p:spPr>
+        <p:txBody>
+          <a:bodyPr>
+            <a:normAutofit/>
+          </a:bodyPr>
+          <a:lstStyle/>
+          <a:p>
+            <a:r>
+              <a:rPr lang="fr-FR" b="1" dirty="0">
+                <a:solidFill>
+                  <a:schemeClr val="accent5">
+                    <a:lumMod val="50000"/>
+                  </a:schemeClr>
+                </a:solidFill>
+                <a:latin typeface="Calibri" panose="020F0502020204030204" pitchFamily="34" charset="0"/>
+              </a:rPr>
+              <a:t>Aperçu Application</a:t>
+            </a:r>
+          </a:p>
+        </p:txBody>
+      </p:sp>
+    </p:spTree>
+    <p:extLst>
+      <p:ext uri="{BB962C8B-B14F-4D97-AF65-F5344CB8AC3E}">
+        <p14:creationId xmlns:p14="http://schemas.microsoft.com/office/powerpoint/2010/main" val="1816403188"/>
+      </p:ext>
+    </p:extLst>
+  </p:cSld>
+  <p:clrMapOvr>
+    <a:masterClrMapping/>
+  </p:clrMapOvr>
+  <p:timing>
+    <p:tnLst>
+      <p:par>
+        <p:cTn id="1" dur="indefinite" restart="never" nodeType="tmRoot">
+          <p:childTnLst>
+            <p:seq concurrent="1" nextAc="seek">
+              <p:cTn id="2" dur="indefinite" nodeType="mainSeq">
+                <p:childTnLst>
+                  <p:par>
+                    <p:cTn id="3" fill="hold">
+                      <p:stCondLst>
+                        <p:cond delay="indefinite"/>
+                      </p:stCondLst>
+                      <p:childTnLst>
+                        <p:par>
+                          <p:cTn id="4" fill="hold">
+                            <p:stCondLst>
+                              <p:cond delay="0"/>
+                            </p:stCondLst>
+                            <p:childTnLst>
+                              <p:par>
+                                <p:cTn id="5" presetID="45" presetClass="entr" presetSubtype="0" fill="hold" grpId="0" nodeType="clickEffect">
+                                  <p:stCondLst>
+                                    <p:cond delay="0"/>
+                                  </p:stCondLst>
+                                  <p:childTnLst>
+                                    <p:set>
+                                      <p:cBhvr>
+                                        <p:cTn id="6" dur="1" fill="hold">
+                                          <p:stCondLst>
+                                            <p:cond delay="0"/>
+                                          </p:stCondLst>
+                                        </p:cTn>
+                                        <p:tgtEl>
+                                          <p:spTgt spid="2"/>
+                                        </p:tgtEl>
+                                        <p:attrNameLst>
+                                          <p:attrName>style.visibility</p:attrName>
+                                        </p:attrNameLst>
+                                      </p:cBhvr>
+                                      <p:to>
+                                        <p:strVal val="visible"/>
+                                      </p:to>
+                                    </p:set>
+                                    <p:animEffect transition="in" filter="fade">
+                                      <p:cBhvr>
+                                        <p:cTn id="7" dur="2000"/>
+                                        <p:tgtEl>
+                                          <p:spTgt spid="2"/>
+                                        </p:tgtEl>
+                                      </p:cBhvr>
+                                    </p:animEffect>
+                                    <p:anim calcmode="lin" valueType="num">
+                                      <p:cBhvr>
+                                        <p:cTn id="8" dur="2000" fill="hold"/>
+                                        <p:tgtEl>
+                                          <p:spTgt spid="2"/>
+                                        </p:tgtEl>
+                                        <p:attrNameLst>
+                                          <p:attrName>ppt_w</p:attrName>
+                                        </p:attrNameLst>
+                                      </p:cBhvr>
+                                      <p:tavLst>
+                                        <p:tav tm="0" fmla="#ppt_w*sin(2.5*pi*$)">
+                                          <p:val>
+                                            <p:fltVal val="0"/>
+                                          </p:val>
+                                        </p:tav>
+                                        <p:tav tm="100000">
+                                          <p:val>
+                                            <p:fltVal val="1"/>
+                                          </p:val>
+                                        </p:tav>
+                                      </p:tavLst>
+                                    </p:anim>
+                                    <p:anim calcmode="lin" valueType="num">
+                                      <p:cBhvr>
+                                        <p:cTn id="9" dur="2000" fill="hold"/>
+                                        <p:tgtEl>
+                                          <p:spTgt spid="2"/>
+                                        </p:tgtEl>
+                                        <p:attrNameLst>
+                                          <p:attrName>ppt_h</p:attrName>
+                                        </p:attrNameLst>
+                                      </p:cBhvr>
+                                      <p:tavLst>
+                                        <p:tav tm="0">
+                                          <p:val>
+                                            <p:strVal val="#ppt_h"/>
+                                          </p:val>
+                                        </p:tav>
+                                        <p:tav tm="100000">
+                                          <p:val>
+                                            <p:strVal val="#ppt_h"/>
+                                          </p:val>
+                                        </p:tav>
+                                      </p:tavLst>
+                                    </p:anim>
+                                  </p:childTnLst>
+                                </p:cTn>
+                              </p:par>
+                            </p:childTnLst>
+                          </p:cTn>
+                        </p:par>
+                      </p:childTnLst>
+                    </p:cTn>
+                  </p:par>
+                </p:childTnLst>
+              </p:cTn>
+              <p:prevCondLst>
+                <p:cond evt="onPrev" delay="0">
+                  <p:tgtEl>
+                    <p:sldTgt/>
+                  </p:tgtEl>
+                </p:cond>
+              </p:prevCondLst>
+              <p:nextCondLst>
+                <p:cond evt="onNext" delay="0">
+                  <p:tgtEl>
+                    <p:sldTgt/>
+                  </p:tgtEl>
+                </p:cond>
+              </p:nextCondLst>
+            </p:seq>
+          </p:childTnLst>
+        </p:cTn>
+      </p:par>
+    </p:tnLst>
+    <p:bldLst>
+      <p:bldP spid="2" grpId="0"/>
+    </p:bldLst>
+  </p:timing>
+</p:sld>
+</file>
+
+<file path=ppt/slides/slide8.xml><?xml version="1.0" encoding="utf-8"?>
+<p:sld xmlns:a="http://schemas.openxmlformats.org/drawingml/2006/main" xmlns:r="http://schemas.openxmlformats.org/officeDocument/2006/relationships" xmlns:p="http://schemas.openxmlformats.org/presentationml/2006/main">
+  <p:cSld>
+    <p:spTree>
+      <p:nvGrpSpPr>
+        <p:cNvPr id="1" name=""/>
+        <p:cNvGrpSpPr/>
+        <p:nvPr/>
+      </p:nvGrpSpPr>
+      <p:grpSpPr>
+        <a:xfrm>
+          <a:off x="0" y="0"/>
+          <a:ext cx="0" cy="0"/>
+          <a:chOff x="0" y="0"/>
+          <a:chExt cx="0" cy="0"/>
+        </a:xfrm>
+      </p:grpSpPr>
+      <p:sp>
+        <p:nvSpPr>
+          <p:cNvPr id="3" name="Content Placeholder 2"/>
+          <p:cNvSpPr>
+            <a:spLocks noGrp="1"/>
+          </p:cNvSpPr>
+          <p:nvPr>
+            <p:ph idx="1"/>
+          </p:nvPr>
+        </p:nvSpPr>
+        <p:spPr>
+          <a:xfrm>
+            <a:off x="3079369" y="1571223"/>
+            <a:ext cx="7185093" cy="4139244"/>
+          </a:xfrm>
+        </p:spPr>
+        <p:txBody>
+          <a:bodyPr/>
+          <a:lstStyle/>
+          <a:p>
+            <a:pPr marL="0" indent="0">
+              <a:buNone/>
+            </a:pPr>
+            <a:r>
+              <a:rPr lang="fr-FR" sz="2000" dirty="0" smtClean="0">
+                <a:solidFill>
+                  <a:schemeClr val="accent6">
+                    <a:lumMod val="50000"/>
+                  </a:schemeClr>
+                </a:solidFill>
+                <a:latin typeface="Calibri" panose="020F0502020204030204" pitchFamily="34" charset="0"/>
+              </a:rPr>
               <a:t>Chef d’équipe: </a:t>
             </a:r>
           </a:p>
@@ -7351,7 +9409,18 @@
             </a:r>
             <a:r>
               <a:rPr lang="fr-FR" dirty="0" smtClean="0"/>
-              <a:t>	BOUALILA Mouad</a:t>
+              <a:t>	</a:t>
+            </a:r>
+            <a:r>
+              <a:rPr lang="fr-FR" dirty="0" smtClean="0">
+                <a:solidFill>
+                  <a:schemeClr val="accent1">
+                    <a:lumMod val="50000"/>
+                  </a:schemeClr>
+                </a:solidFill>
+                <a:latin typeface="Arial Rounded MT Bold" panose="020F0704030504030204" pitchFamily="34" charset="0"/>
+              </a:rPr>
+              <a:t>BOUALILA Mouad</a:t>
             </a:r>
           </a:p>
           <a:p>
@@ -7359,14 +9428,27 @@
               <a:buNone/>
             </a:pPr>
             <a:r>
-              <a:rPr lang="fr-FR" sz="2000" dirty="0"/>
+              <a:rPr lang="fr-FR" sz="2000" dirty="0">
+                <a:solidFill>
+                  <a:schemeClr val="accent6">
+                    <a:lumMod val="50000"/>
+                  </a:schemeClr>
+                </a:solidFill>
+                <a:latin typeface="Calibri" panose="020F0502020204030204" pitchFamily="34" charset="0"/>
+              </a:rPr>
               <a:t>Membres de </a:t>
             </a:r>
             <a:r>
-              <a:rPr lang="fr-FR" sz="2000" dirty="0" smtClean="0"/>
+              <a:rPr lang="fr-FR" sz="2000" dirty="0">
+                <a:solidFill>
+                  <a:schemeClr val="accent6">
+                    <a:lumMod val="50000"/>
+                  </a:schemeClr>
+                </a:solidFill>
+                <a:latin typeface="Calibri" panose="020F0502020204030204" pitchFamily="34" charset="0"/>
+              </a:rPr>
               <a:t>l’équipe:</a:t>
             </a:r>
-            <a:endParaRPr lang="fr-FR" dirty="0" smtClean="0"/>
           </a:p>
           <a:p>
             <a:pPr marL="0" indent="0">
@@ -7378,7 +9460,18 @@
             </a:r>
             <a:r>
               <a:rPr lang="fr-FR" dirty="0" smtClean="0"/>
-              <a:t>	EL HAZITI Ijlal</a:t>
+              <a:t>	</a:t>
+            </a:r>
+            <a:r>
+              <a:rPr lang="fr-FR" dirty="0">
+                <a:solidFill>
+                  <a:schemeClr val="accent1">
+                    <a:lumMod val="50000"/>
+                  </a:schemeClr>
+                </a:solidFill>
+                <a:latin typeface="Arial Rounded MT Bold" panose="020F0704030504030204" pitchFamily="34" charset="0"/>
+              </a:rPr>
+              <a:t>EL HAZITI Ijlal</a:t>
             </a:r>
           </a:p>
           <a:p>
@@ -7386,11 +9479,25 @@
               <a:buNone/>
             </a:pPr>
             <a:r>
-              <a:rPr lang="fr-FR" dirty="0"/>
+              <a:rPr lang="fr-FR" dirty="0">
+                <a:solidFill>
+                  <a:schemeClr val="accent1">
+                    <a:lumMod val="50000"/>
+                  </a:schemeClr>
+                </a:solidFill>
+                <a:latin typeface="Arial Rounded MT Bold" panose="020F0704030504030204" pitchFamily="34" charset="0"/>
+              </a:rPr>
               <a:t>	</a:t>
             </a:r>
             <a:r>
-              <a:rPr lang="fr-FR" dirty="0" smtClean="0"/>
+              <a:rPr lang="fr-FR" dirty="0">
+                <a:solidFill>
+                  <a:schemeClr val="accent1">
+                    <a:lumMod val="50000"/>
+                  </a:schemeClr>
+                </a:solidFill>
+                <a:latin typeface="Arial Rounded MT Bold" panose="020F0704030504030204" pitchFamily="34" charset="0"/>
+              </a:rPr>
               <a:t>	EL HARCHAOUI Samira</a:t>
             </a:r>
           </a:p>
@@ -7399,14 +9506,35 @@
               <a:buNone/>
             </a:pPr>
             <a:r>
-              <a:rPr lang="fr-FR" smtClean="0"/>
+              <a:rPr lang="fr-FR" dirty="0">
+                <a:solidFill>
+                  <a:schemeClr val="accent1">
+                    <a:lumMod val="50000"/>
+                  </a:schemeClr>
+                </a:solidFill>
+                <a:latin typeface="Arial Rounded MT Bold" panose="020F0704030504030204" pitchFamily="34" charset="0"/>
+              </a:rPr>
               <a:t>		EL </a:t>
             </a:r>
             <a:r>
-              <a:rPr lang="fr-FR"/>
+              <a:rPr lang="fr-FR" dirty="0">
+                <a:solidFill>
+                  <a:schemeClr val="accent1">
+                    <a:lumMod val="50000"/>
+                  </a:schemeClr>
+                </a:solidFill>
+                <a:latin typeface="Arial Rounded MT Bold" panose="020F0704030504030204" pitchFamily="34" charset="0"/>
+              </a:rPr>
               <a:t>FTOUH Jabir</a:t>
             </a:r>
-            <a:endParaRPr lang="fr-FR" dirty="0" smtClean="0"/>
+            <a:endParaRPr lang="fr-FR" dirty="0">
+              <a:solidFill>
+                <a:schemeClr val="accent1">
+                  <a:lumMod val="50000"/>
+                </a:schemeClr>
+              </a:solidFill>
+              <a:latin typeface="Arial Rounded MT Bold" panose="020F0704030504030204" pitchFamily="34" charset="0"/>
+            </a:endParaRPr>
           </a:p>
           <a:p>
             <a:pPr marL="0" indent="0">
@@ -7429,9 +9557,725 @@
   <p:timing>
     <p:tnLst>
       <p:par>
-        <p:cTn id="1" dur="indefinite" restart="never" nodeType="tmRoot"/>
+        <p:cTn id="1" dur="indefinite" restart="never" nodeType="tmRoot">
+          <p:childTnLst>
+            <p:seq concurrent="1" nextAc="seek">
+              <p:cTn id="2" dur="indefinite" nodeType="mainSeq">
+                <p:childTnLst>
+                  <p:par>
+                    <p:cTn id="3" fill="hold">
+                      <p:stCondLst>
+                        <p:cond delay="indefinite"/>
+                      </p:stCondLst>
+                      <p:childTnLst>
+                        <p:par>
+                          <p:cTn id="4" fill="hold">
+                            <p:stCondLst>
+                              <p:cond delay="0"/>
+                            </p:stCondLst>
+                            <p:childTnLst>
+                              <p:par>
+                                <p:cTn id="5" presetID="53" presetClass="entr" presetSubtype="16" fill="hold" grpId="0" nodeType="clickEffect">
+                                  <p:stCondLst>
+                                    <p:cond delay="0"/>
+                                  </p:stCondLst>
+                                  <p:childTnLst>
+                                    <p:set>
+                                      <p:cBhvr>
+                                        <p:cTn id="6" dur="1" fill="hold">
+                                          <p:stCondLst>
+                                            <p:cond delay="0"/>
+                                          </p:stCondLst>
+                                        </p:cTn>
+                                        <p:tgtEl>
+                                          <p:spTgt spid="3">
+                                            <p:txEl>
+                                              <p:pRg st="0" end="0"/>
+                                            </p:txEl>
+                                          </p:spTgt>
+                                        </p:tgtEl>
+                                        <p:attrNameLst>
+                                          <p:attrName>style.visibility</p:attrName>
+                                        </p:attrNameLst>
+                                      </p:cBhvr>
+                                      <p:to>
+                                        <p:strVal val="visible"/>
+                                      </p:to>
+                                    </p:set>
+                                    <p:anim calcmode="lin" valueType="num">
+                                      <p:cBhvr>
+                                        <p:cTn id="7" dur="500" fill="hold"/>
+                                        <p:tgtEl>
+                                          <p:spTgt spid="3">
+                                            <p:txEl>
+                                              <p:pRg st="0" end="0"/>
+                                            </p:txEl>
+                                          </p:spTgt>
+                                        </p:tgtEl>
+                                        <p:attrNameLst>
+                                          <p:attrName>ppt_w</p:attrName>
+                                        </p:attrNameLst>
+                                      </p:cBhvr>
+                                      <p:tavLst>
+                                        <p:tav tm="0">
+                                          <p:val>
+                                            <p:fltVal val="0"/>
+                                          </p:val>
+                                        </p:tav>
+                                        <p:tav tm="100000">
+                                          <p:val>
+                                            <p:strVal val="#ppt_w"/>
+                                          </p:val>
+                                        </p:tav>
+                                      </p:tavLst>
+                                    </p:anim>
+                                    <p:anim calcmode="lin" valueType="num">
+                                      <p:cBhvr>
+                                        <p:cTn id="8" dur="500" fill="hold"/>
+                                        <p:tgtEl>
+                                          <p:spTgt spid="3">
+                                            <p:txEl>
+                                              <p:pRg st="0" end="0"/>
+                                            </p:txEl>
+                                          </p:spTgt>
+                                        </p:tgtEl>
+                                        <p:attrNameLst>
+                                          <p:attrName>ppt_h</p:attrName>
+                                        </p:attrNameLst>
+                                      </p:cBhvr>
+                                      <p:tavLst>
+                                        <p:tav tm="0">
+                                          <p:val>
+                                            <p:fltVal val="0"/>
+                                          </p:val>
+                                        </p:tav>
+                                        <p:tav tm="100000">
+                                          <p:val>
+                                            <p:strVal val="#ppt_h"/>
+                                          </p:val>
+                                        </p:tav>
+                                      </p:tavLst>
+                                    </p:anim>
+                                    <p:animEffect transition="in" filter="fade">
+                                      <p:cBhvr>
+                                        <p:cTn id="9" dur="500"/>
+                                        <p:tgtEl>
+                                          <p:spTgt spid="3">
+                                            <p:txEl>
+                                              <p:pRg st="0" end="0"/>
+                                            </p:txEl>
+                                          </p:spTgt>
+                                        </p:tgtEl>
+                                      </p:cBhvr>
+                                    </p:animEffect>
+                                  </p:childTnLst>
+                                </p:cTn>
+                              </p:par>
+                            </p:childTnLst>
+                          </p:cTn>
+                        </p:par>
+                      </p:childTnLst>
+                    </p:cTn>
+                  </p:par>
+                  <p:par>
+                    <p:cTn id="10" fill="hold">
+                      <p:stCondLst>
+                        <p:cond delay="indefinite"/>
+                      </p:stCondLst>
+                      <p:childTnLst>
+                        <p:par>
+                          <p:cTn id="11" fill="hold">
+                            <p:stCondLst>
+                              <p:cond delay="0"/>
+                            </p:stCondLst>
+                            <p:childTnLst>
+                              <p:par>
+                                <p:cTn id="12" presetID="53" presetClass="entr" presetSubtype="16" fill="hold" grpId="0" nodeType="clickEffect">
+                                  <p:stCondLst>
+                                    <p:cond delay="0"/>
+                                  </p:stCondLst>
+                                  <p:childTnLst>
+                                    <p:set>
+                                      <p:cBhvr>
+                                        <p:cTn id="13" dur="1" fill="hold">
+                                          <p:stCondLst>
+                                            <p:cond delay="0"/>
+                                          </p:stCondLst>
+                                        </p:cTn>
+                                        <p:tgtEl>
+                                          <p:spTgt spid="3">
+                                            <p:txEl>
+                                              <p:pRg st="1" end="1"/>
+                                            </p:txEl>
+                                          </p:spTgt>
+                                        </p:tgtEl>
+                                        <p:attrNameLst>
+                                          <p:attrName>style.visibility</p:attrName>
+                                        </p:attrNameLst>
+                                      </p:cBhvr>
+                                      <p:to>
+                                        <p:strVal val="visible"/>
+                                      </p:to>
+                                    </p:set>
+                                    <p:anim calcmode="lin" valueType="num">
+                                      <p:cBhvr>
+                                        <p:cTn id="14" dur="500" fill="hold"/>
+                                        <p:tgtEl>
+                                          <p:spTgt spid="3">
+                                            <p:txEl>
+                                              <p:pRg st="1" end="1"/>
+                                            </p:txEl>
+                                          </p:spTgt>
+                                        </p:tgtEl>
+                                        <p:attrNameLst>
+                                          <p:attrName>ppt_w</p:attrName>
+                                        </p:attrNameLst>
+                                      </p:cBhvr>
+                                      <p:tavLst>
+                                        <p:tav tm="0">
+                                          <p:val>
+                                            <p:fltVal val="0"/>
+                                          </p:val>
+                                        </p:tav>
+                                        <p:tav tm="100000">
+                                          <p:val>
+                                            <p:strVal val="#ppt_w"/>
+                                          </p:val>
+                                        </p:tav>
+                                      </p:tavLst>
+                                    </p:anim>
+                                    <p:anim calcmode="lin" valueType="num">
+                                      <p:cBhvr>
+                                        <p:cTn id="15" dur="500" fill="hold"/>
+                                        <p:tgtEl>
+                                          <p:spTgt spid="3">
+                                            <p:txEl>
+                                              <p:pRg st="1" end="1"/>
+                                            </p:txEl>
+                                          </p:spTgt>
+                                        </p:tgtEl>
+                                        <p:attrNameLst>
+                                          <p:attrName>ppt_h</p:attrName>
+                                        </p:attrNameLst>
+                                      </p:cBhvr>
+                                      <p:tavLst>
+                                        <p:tav tm="0">
+                                          <p:val>
+                                            <p:fltVal val="0"/>
+                                          </p:val>
+                                        </p:tav>
+                                        <p:tav tm="100000">
+                                          <p:val>
+                                            <p:strVal val="#ppt_h"/>
+                                          </p:val>
+                                        </p:tav>
+                                      </p:tavLst>
+                                    </p:anim>
+                                    <p:animEffect transition="in" filter="fade">
+                                      <p:cBhvr>
+                                        <p:cTn id="16" dur="500"/>
+                                        <p:tgtEl>
+                                          <p:spTgt spid="3">
+                                            <p:txEl>
+                                              <p:pRg st="1" end="1"/>
+                                            </p:txEl>
+                                          </p:spTgt>
+                                        </p:tgtEl>
+                                      </p:cBhvr>
+                                    </p:animEffect>
+                                  </p:childTnLst>
+                                </p:cTn>
+                              </p:par>
+                            </p:childTnLst>
+                          </p:cTn>
+                        </p:par>
+                      </p:childTnLst>
+                    </p:cTn>
+                  </p:par>
+                  <p:par>
+                    <p:cTn id="17" fill="hold">
+                      <p:stCondLst>
+                        <p:cond delay="indefinite"/>
+                      </p:stCondLst>
+                      <p:childTnLst>
+                        <p:par>
+                          <p:cTn id="18" fill="hold">
+                            <p:stCondLst>
+                              <p:cond delay="0"/>
+                            </p:stCondLst>
+                            <p:childTnLst>
+                              <p:par>
+                                <p:cTn id="19" presetID="53" presetClass="entr" presetSubtype="16" fill="hold" grpId="0" nodeType="clickEffect">
+                                  <p:stCondLst>
+                                    <p:cond delay="0"/>
+                                  </p:stCondLst>
+                                  <p:childTnLst>
+                                    <p:set>
+                                      <p:cBhvr>
+                                        <p:cTn id="20" dur="1" fill="hold">
+                                          <p:stCondLst>
+                                            <p:cond delay="0"/>
+                                          </p:stCondLst>
+                                        </p:cTn>
+                                        <p:tgtEl>
+                                          <p:spTgt spid="3">
+                                            <p:txEl>
+                                              <p:pRg st="2" end="2"/>
+                                            </p:txEl>
+                                          </p:spTgt>
+                                        </p:tgtEl>
+                                        <p:attrNameLst>
+                                          <p:attrName>style.visibility</p:attrName>
+                                        </p:attrNameLst>
+                                      </p:cBhvr>
+                                      <p:to>
+                                        <p:strVal val="visible"/>
+                                      </p:to>
+                                    </p:set>
+                                    <p:anim calcmode="lin" valueType="num">
+                                      <p:cBhvr>
+                                        <p:cTn id="21" dur="500" fill="hold"/>
+                                        <p:tgtEl>
+                                          <p:spTgt spid="3">
+                                            <p:txEl>
+                                              <p:pRg st="2" end="2"/>
+                                            </p:txEl>
+                                          </p:spTgt>
+                                        </p:tgtEl>
+                                        <p:attrNameLst>
+                                          <p:attrName>ppt_w</p:attrName>
+                                        </p:attrNameLst>
+                                      </p:cBhvr>
+                                      <p:tavLst>
+                                        <p:tav tm="0">
+                                          <p:val>
+                                            <p:fltVal val="0"/>
+                                          </p:val>
+                                        </p:tav>
+                                        <p:tav tm="100000">
+                                          <p:val>
+                                            <p:strVal val="#ppt_w"/>
+                                          </p:val>
+                                        </p:tav>
+                                      </p:tavLst>
+                                    </p:anim>
+                                    <p:anim calcmode="lin" valueType="num">
+                                      <p:cBhvr>
+                                        <p:cTn id="22" dur="500" fill="hold"/>
+                                        <p:tgtEl>
+                                          <p:spTgt spid="3">
+                                            <p:txEl>
+                                              <p:pRg st="2" end="2"/>
+                                            </p:txEl>
+                                          </p:spTgt>
+                                        </p:tgtEl>
+                                        <p:attrNameLst>
+                                          <p:attrName>ppt_h</p:attrName>
+                                        </p:attrNameLst>
+                                      </p:cBhvr>
+                                      <p:tavLst>
+                                        <p:tav tm="0">
+                                          <p:val>
+                                            <p:fltVal val="0"/>
+                                          </p:val>
+                                        </p:tav>
+                                        <p:tav tm="100000">
+                                          <p:val>
+                                            <p:strVal val="#ppt_h"/>
+                                          </p:val>
+                                        </p:tav>
+                                      </p:tavLst>
+                                    </p:anim>
+                                    <p:animEffect transition="in" filter="fade">
+                                      <p:cBhvr>
+                                        <p:cTn id="23" dur="500"/>
+                                        <p:tgtEl>
+                                          <p:spTgt spid="3">
+                                            <p:txEl>
+                                              <p:pRg st="2" end="2"/>
+                                            </p:txEl>
+                                          </p:spTgt>
+                                        </p:tgtEl>
+                                      </p:cBhvr>
+                                    </p:animEffect>
+                                  </p:childTnLst>
+                                </p:cTn>
+                              </p:par>
+                            </p:childTnLst>
+                          </p:cTn>
+                        </p:par>
+                      </p:childTnLst>
+                    </p:cTn>
+                  </p:par>
+                  <p:par>
+                    <p:cTn id="24" fill="hold">
+                      <p:stCondLst>
+                        <p:cond delay="indefinite"/>
+                      </p:stCondLst>
+                      <p:childTnLst>
+                        <p:par>
+                          <p:cTn id="25" fill="hold">
+                            <p:stCondLst>
+                              <p:cond delay="0"/>
+                            </p:stCondLst>
+                            <p:childTnLst>
+                              <p:par>
+                                <p:cTn id="26" presetID="53" presetClass="entr" presetSubtype="16" fill="hold" grpId="0" nodeType="clickEffect">
+                                  <p:stCondLst>
+                                    <p:cond delay="0"/>
+                                  </p:stCondLst>
+                                  <p:childTnLst>
+                                    <p:set>
+                                      <p:cBhvr>
+                                        <p:cTn id="27" dur="1" fill="hold">
+                                          <p:stCondLst>
+                                            <p:cond delay="0"/>
+                                          </p:stCondLst>
+                                        </p:cTn>
+                                        <p:tgtEl>
+                                          <p:spTgt spid="3">
+                                            <p:txEl>
+                                              <p:pRg st="3" end="3"/>
+                                            </p:txEl>
+                                          </p:spTgt>
+                                        </p:tgtEl>
+                                        <p:attrNameLst>
+                                          <p:attrName>style.visibility</p:attrName>
+                                        </p:attrNameLst>
+                                      </p:cBhvr>
+                                      <p:to>
+                                        <p:strVal val="visible"/>
+                                      </p:to>
+                                    </p:set>
+                                    <p:anim calcmode="lin" valueType="num">
+                                      <p:cBhvr>
+                                        <p:cTn id="28" dur="500" fill="hold"/>
+                                        <p:tgtEl>
+                                          <p:spTgt spid="3">
+                                            <p:txEl>
+                                              <p:pRg st="3" end="3"/>
+                                            </p:txEl>
+                                          </p:spTgt>
+                                        </p:tgtEl>
+                                        <p:attrNameLst>
+                                          <p:attrName>ppt_w</p:attrName>
+                                        </p:attrNameLst>
+                                      </p:cBhvr>
+                                      <p:tavLst>
+                                        <p:tav tm="0">
+                                          <p:val>
+                                            <p:fltVal val="0"/>
+                                          </p:val>
+                                        </p:tav>
+                                        <p:tav tm="100000">
+                                          <p:val>
+                                            <p:strVal val="#ppt_w"/>
+                                          </p:val>
+                                        </p:tav>
+                                      </p:tavLst>
+                                    </p:anim>
+                                    <p:anim calcmode="lin" valueType="num">
+                                      <p:cBhvr>
+                                        <p:cTn id="29" dur="500" fill="hold"/>
+                                        <p:tgtEl>
+                                          <p:spTgt spid="3">
+                                            <p:txEl>
+                                              <p:pRg st="3" end="3"/>
+                                            </p:txEl>
+                                          </p:spTgt>
+                                        </p:tgtEl>
+                                        <p:attrNameLst>
+                                          <p:attrName>ppt_h</p:attrName>
+                                        </p:attrNameLst>
+                                      </p:cBhvr>
+                                      <p:tavLst>
+                                        <p:tav tm="0">
+                                          <p:val>
+                                            <p:fltVal val="0"/>
+                                          </p:val>
+                                        </p:tav>
+                                        <p:tav tm="100000">
+                                          <p:val>
+                                            <p:strVal val="#ppt_h"/>
+                                          </p:val>
+                                        </p:tav>
+                                      </p:tavLst>
+                                    </p:anim>
+                                    <p:animEffect transition="in" filter="fade">
+                                      <p:cBhvr>
+                                        <p:cTn id="30" dur="500"/>
+                                        <p:tgtEl>
+                                          <p:spTgt spid="3">
+                                            <p:txEl>
+                                              <p:pRg st="3" end="3"/>
+                                            </p:txEl>
+                                          </p:spTgt>
+                                        </p:tgtEl>
+                                      </p:cBhvr>
+                                    </p:animEffect>
+                                  </p:childTnLst>
+                                </p:cTn>
+                              </p:par>
+                            </p:childTnLst>
+                          </p:cTn>
+                        </p:par>
+                      </p:childTnLst>
+                    </p:cTn>
+                  </p:par>
+                  <p:par>
+                    <p:cTn id="31" fill="hold">
+                      <p:stCondLst>
+                        <p:cond delay="indefinite"/>
+                      </p:stCondLst>
+                      <p:childTnLst>
+                        <p:par>
+                          <p:cTn id="32" fill="hold">
+                            <p:stCondLst>
+                              <p:cond delay="0"/>
+                            </p:stCondLst>
+                            <p:childTnLst>
+                              <p:par>
+                                <p:cTn id="33" presetID="53" presetClass="entr" presetSubtype="16" fill="hold" grpId="0" nodeType="clickEffect">
+                                  <p:stCondLst>
+                                    <p:cond delay="0"/>
+                                  </p:stCondLst>
+                                  <p:childTnLst>
+                                    <p:set>
+                                      <p:cBhvr>
+                                        <p:cTn id="34" dur="1" fill="hold">
+                                          <p:stCondLst>
+                                            <p:cond delay="0"/>
+                                          </p:stCondLst>
+                                        </p:cTn>
+                                        <p:tgtEl>
+                                          <p:spTgt spid="3">
+                                            <p:txEl>
+                                              <p:pRg st="4" end="4"/>
+                                            </p:txEl>
+                                          </p:spTgt>
+                                        </p:tgtEl>
+                                        <p:attrNameLst>
+                                          <p:attrName>style.visibility</p:attrName>
+                                        </p:attrNameLst>
+                                      </p:cBhvr>
+                                      <p:to>
+                                        <p:strVal val="visible"/>
+                                      </p:to>
+                                    </p:set>
+                                    <p:anim calcmode="lin" valueType="num">
+                                      <p:cBhvr>
+                                        <p:cTn id="35" dur="500" fill="hold"/>
+                                        <p:tgtEl>
+                                          <p:spTgt spid="3">
+                                            <p:txEl>
+                                              <p:pRg st="4" end="4"/>
+                                            </p:txEl>
+                                          </p:spTgt>
+                                        </p:tgtEl>
+                                        <p:attrNameLst>
+                                          <p:attrName>ppt_w</p:attrName>
+                                        </p:attrNameLst>
+                                      </p:cBhvr>
+                                      <p:tavLst>
+                                        <p:tav tm="0">
+                                          <p:val>
+                                            <p:fltVal val="0"/>
+                                          </p:val>
+                                        </p:tav>
+                                        <p:tav tm="100000">
+                                          <p:val>
+                                            <p:strVal val="#ppt_w"/>
+                                          </p:val>
+                                        </p:tav>
+                                      </p:tavLst>
+                                    </p:anim>
+                                    <p:anim calcmode="lin" valueType="num">
+                                      <p:cBhvr>
+                                        <p:cTn id="36" dur="500" fill="hold"/>
+                                        <p:tgtEl>
+                                          <p:spTgt spid="3">
+                                            <p:txEl>
+                                              <p:pRg st="4" end="4"/>
+                                            </p:txEl>
+                                          </p:spTgt>
+                                        </p:tgtEl>
+                                        <p:attrNameLst>
+                                          <p:attrName>ppt_h</p:attrName>
+                                        </p:attrNameLst>
+                                      </p:cBhvr>
+                                      <p:tavLst>
+                                        <p:tav tm="0">
+                                          <p:val>
+                                            <p:fltVal val="0"/>
+                                          </p:val>
+                                        </p:tav>
+                                        <p:tav tm="100000">
+                                          <p:val>
+                                            <p:strVal val="#ppt_h"/>
+                                          </p:val>
+                                        </p:tav>
+                                      </p:tavLst>
+                                    </p:anim>
+                                    <p:animEffect transition="in" filter="fade">
+                                      <p:cBhvr>
+                                        <p:cTn id="37" dur="500"/>
+                                        <p:tgtEl>
+                                          <p:spTgt spid="3">
+                                            <p:txEl>
+                                              <p:pRg st="4" end="4"/>
+                                            </p:txEl>
+                                          </p:spTgt>
+                                        </p:tgtEl>
+                                      </p:cBhvr>
+                                    </p:animEffect>
+                                  </p:childTnLst>
+                                </p:cTn>
+                              </p:par>
+                            </p:childTnLst>
+                          </p:cTn>
+                        </p:par>
+                      </p:childTnLst>
+                    </p:cTn>
+                  </p:par>
+                  <p:par>
+                    <p:cTn id="38" fill="hold">
+                      <p:stCondLst>
+                        <p:cond delay="indefinite"/>
+                      </p:stCondLst>
+                      <p:childTnLst>
+                        <p:par>
+                          <p:cTn id="39" fill="hold">
+                            <p:stCondLst>
+                              <p:cond delay="0"/>
+                            </p:stCondLst>
+                            <p:childTnLst>
+                              <p:par>
+                                <p:cTn id="40" presetID="53" presetClass="entr" presetSubtype="16" fill="hold" grpId="0" nodeType="clickEffect">
+                                  <p:stCondLst>
+                                    <p:cond delay="0"/>
+                                  </p:stCondLst>
+                                  <p:childTnLst>
+                                    <p:set>
+                                      <p:cBhvr>
+                                        <p:cTn id="41" dur="1" fill="hold">
+                                          <p:stCondLst>
+                                            <p:cond delay="0"/>
+                                          </p:stCondLst>
+                                        </p:cTn>
+                                        <p:tgtEl>
+                                          <p:spTgt spid="3">
+                                            <p:txEl>
+                                              <p:pRg st="5" end="5"/>
+                                            </p:txEl>
+                                          </p:spTgt>
+                                        </p:tgtEl>
+                                        <p:attrNameLst>
+                                          <p:attrName>style.visibility</p:attrName>
+                                        </p:attrNameLst>
+                                      </p:cBhvr>
+                                      <p:to>
+                                        <p:strVal val="visible"/>
+                                      </p:to>
+                                    </p:set>
+                                    <p:anim calcmode="lin" valueType="num">
+                                      <p:cBhvr>
+                                        <p:cTn id="42" dur="500" fill="hold"/>
+                                        <p:tgtEl>
+                                          <p:spTgt spid="3">
+                                            <p:txEl>
+                                              <p:pRg st="5" end="5"/>
+                                            </p:txEl>
+                                          </p:spTgt>
+                                        </p:tgtEl>
+                                        <p:attrNameLst>
+                                          <p:attrName>ppt_w</p:attrName>
+                                        </p:attrNameLst>
+                                      </p:cBhvr>
+                                      <p:tavLst>
+                                        <p:tav tm="0">
+                                          <p:val>
+                                            <p:fltVal val="0"/>
+                                          </p:val>
+                                        </p:tav>
+                                        <p:tav tm="100000">
+                                          <p:val>
+                                            <p:strVal val="#ppt_w"/>
+                                          </p:val>
+                                        </p:tav>
+                                      </p:tavLst>
+                                    </p:anim>
+                                    <p:anim calcmode="lin" valueType="num">
+                                      <p:cBhvr>
+                                        <p:cTn id="43" dur="500" fill="hold"/>
+                                        <p:tgtEl>
+                                          <p:spTgt spid="3">
+                                            <p:txEl>
+                                              <p:pRg st="5" end="5"/>
+                                            </p:txEl>
+                                          </p:spTgt>
+                                        </p:tgtEl>
+                                        <p:attrNameLst>
+                                          <p:attrName>ppt_h</p:attrName>
+                                        </p:attrNameLst>
+                                      </p:cBhvr>
+                                      <p:tavLst>
+                                        <p:tav tm="0">
+                                          <p:val>
+                                            <p:fltVal val="0"/>
+                                          </p:val>
+                                        </p:tav>
+                                        <p:tav tm="100000">
+                                          <p:val>
+                                            <p:strVal val="#ppt_h"/>
+                                          </p:val>
+                                        </p:tav>
+                                      </p:tavLst>
+                                    </p:anim>
+                                    <p:animEffect transition="in" filter="fade">
+                                      <p:cBhvr>
+                                        <p:cTn id="44" dur="500"/>
+                                        <p:tgtEl>
+                                          <p:spTgt spid="3">
+                                            <p:txEl>
+                                              <p:pRg st="5" end="5"/>
+                                            </p:txEl>
+                                          </p:spTgt>
+                                        </p:tgtEl>
+                                      </p:cBhvr>
+                                    </p:animEffect>
+                                  </p:childTnLst>
+                                </p:cTn>
+                              </p:par>
+                            </p:childTnLst>
+                          </p:cTn>
+                        </p:par>
+                      </p:childTnLst>
+                    </p:cTn>
+                  </p:par>
+                </p:childTnLst>
+              </p:cTn>
+              <p:prevCondLst>
+                <p:cond evt="onPrev" delay="0">
+                  <p:tgtEl>
+                    <p:sldTgt/>
+                  </p:tgtEl>
+                </p:cond>
+              </p:prevCondLst>
+              <p:nextCondLst>
+                <p:cond evt="onNext" delay="0">
+                  <p:tgtEl>
+                    <p:sldTgt/>
+                  </p:tgtEl>
+                </p:cond>
+              </p:nextCondLst>
+            </p:seq>
+          </p:childTnLst>
+        </p:cTn>
       </p:par>
     </p:tnLst>
+    <p:bldLst>
+      <p:bldP spid="3" grpId="0" build="p"/>
+    </p:bldLst>
   </p:timing>
 </p:sld>
 </file>

</xml_diff>